<commit_message>
Arbeit gutes stück vorran gebracht bei 3.2 stehen geblieben
</commit_message>
<xml_diff>
--- a/Dokumentation/MuVi_UML.pptx
+++ b/Dokumentation/MuVi_UML.pptx
@@ -272,7 +272,7 @@
           <a:p>
             <a:fld id="{FF92012A-9EAD-4E69-9955-F0E1EC4FC4DA}" type="datetimeFigureOut">
               <a:rPr lang="de-DE" smtClean="0"/>
-              <a:t>11.11.2023</a:t>
+              <a:t>14.11.2023</a:t>
             </a:fld>
             <a:endParaRPr lang="de-DE"/>
           </a:p>
@@ -470,7 +470,7 @@
           <a:p>
             <a:fld id="{FF92012A-9EAD-4E69-9955-F0E1EC4FC4DA}" type="datetimeFigureOut">
               <a:rPr lang="de-DE" smtClean="0"/>
-              <a:t>11.11.2023</a:t>
+              <a:t>14.11.2023</a:t>
             </a:fld>
             <a:endParaRPr lang="de-DE"/>
           </a:p>
@@ -678,7 +678,7 @@
           <a:p>
             <a:fld id="{FF92012A-9EAD-4E69-9955-F0E1EC4FC4DA}" type="datetimeFigureOut">
               <a:rPr lang="de-DE" smtClean="0"/>
-              <a:t>11.11.2023</a:t>
+              <a:t>14.11.2023</a:t>
             </a:fld>
             <a:endParaRPr lang="de-DE"/>
           </a:p>
@@ -876,7 +876,7 @@
           <a:p>
             <a:fld id="{FF92012A-9EAD-4E69-9955-F0E1EC4FC4DA}" type="datetimeFigureOut">
               <a:rPr lang="de-DE" smtClean="0"/>
-              <a:t>11.11.2023</a:t>
+              <a:t>14.11.2023</a:t>
             </a:fld>
             <a:endParaRPr lang="de-DE"/>
           </a:p>
@@ -1151,7 +1151,7 @@
           <a:p>
             <a:fld id="{FF92012A-9EAD-4E69-9955-F0E1EC4FC4DA}" type="datetimeFigureOut">
               <a:rPr lang="de-DE" smtClean="0"/>
-              <a:t>11.11.2023</a:t>
+              <a:t>14.11.2023</a:t>
             </a:fld>
             <a:endParaRPr lang="de-DE"/>
           </a:p>
@@ -1416,7 +1416,7 @@
           <a:p>
             <a:fld id="{FF92012A-9EAD-4E69-9955-F0E1EC4FC4DA}" type="datetimeFigureOut">
               <a:rPr lang="de-DE" smtClean="0"/>
-              <a:t>11.11.2023</a:t>
+              <a:t>14.11.2023</a:t>
             </a:fld>
             <a:endParaRPr lang="de-DE"/>
           </a:p>
@@ -1828,7 +1828,7 @@
           <a:p>
             <a:fld id="{FF92012A-9EAD-4E69-9955-F0E1EC4FC4DA}" type="datetimeFigureOut">
               <a:rPr lang="de-DE" smtClean="0"/>
-              <a:t>11.11.2023</a:t>
+              <a:t>14.11.2023</a:t>
             </a:fld>
             <a:endParaRPr lang="de-DE"/>
           </a:p>
@@ -1969,7 +1969,7 @@
           <a:p>
             <a:fld id="{FF92012A-9EAD-4E69-9955-F0E1EC4FC4DA}" type="datetimeFigureOut">
               <a:rPr lang="de-DE" smtClean="0"/>
-              <a:t>11.11.2023</a:t>
+              <a:t>14.11.2023</a:t>
             </a:fld>
             <a:endParaRPr lang="de-DE"/>
           </a:p>
@@ -2082,7 +2082,7 @@
           <a:p>
             <a:fld id="{FF92012A-9EAD-4E69-9955-F0E1EC4FC4DA}" type="datetimeFigureOut">
               <a:rPr lang="de-DE" smtClean="0"/>
-              <a:t>11.11.2023</a:t>
+              <a:t>14.11.2023</a:t>
             </a:fld>
             <a:endParaRPr lang="de-DE"/>
           </a:p>
@@ -2393,7 +2393,7 @@
           <a:p>
             <a:fld id="{FF92012A-9EAD-4E69-9955-F0E1EC4FC4DA}" type="datetimeFigureOut">
               <a:rPr lang="de-DE" smtClean="0"/>
-              <a:t>11.11.2023</a:t>
+              <a:t>14.11.2023</a:t>
             </a:fld>
             <a:endParaRPr lang="de-DE"/>
           </a:p>
@@ -2681,7 +2681,7 @@
           <a:p>
             <a:fld id="{FF92012A-9EAD-4E69-9955-F0E1EC4FC4DA}" type="datetimeFigureOut">
               <a:rPr lang="de-DE" smtClean="0"/>
-              <a:t>11.11.2023</a:t>
+              <a:t>14.11.2023</a:t>
             </a:fld>
             <a:endParaRPr lang="de-DE"/>
           </a:p>
@@ -2922,7 +2922,7 @@
           <a:p>
             <a:fld id="{FF92012A-9EAD-4E69-9955-F0E1EC4FC4DA}" type="datetimeFigureOut">
               <a:rPr lang="de-DE" smtClean="0"/>
-              <a:t>11.11.2023</a:t>
+              <a:t>14.11.2023</a:t>
             </a:fld>
             <a:endParaRPr lang="de-DE"/>
           </a:p>
@@ -3532,8 +3532,8 @@
         </p:nvSpPr>
         <p:spPr>
           <a:xfrm>
-            <a:off x="3463636" y="2588196"/>
-            <a:ext cx="7379855" cy="842818"/>
+            <a:off x="3804114" y="2588196"/>
+            <a:ext cx="7081982" cy="842818"/>
           </a:xfrm>
           <a:prstGeom prst="rect">
             <a:avLst/>
@@ -3580,8 +3580,8 @@
         </p:nvSpPr>
         <p:spPr>
           <a:xfrm>
-            <a:off x="3463636" y="4050083"/>
-            <a:ext cx="7379855" cy="842818"/>
+            <a:off x="3804114" y="4050083"/>
+            <a:ext cx="7081982" cy="842818"/>
           </a:xfrm>
           <a:prstGeom prst="rect">
             <a:avLst/>
@@ -3628,8 +3628,8 @@
         </p:nvSpPr>
         <p:spPr>
           <a:xfrm>
-            <a:off x="3463637" y="5511970"/>
-            <a:ext cx="7379855" cy="842818"/>
+            <a:off x="3804115" y="5511970"/>
+            <a:ext cx="7081982" cy="842818"/>
           </a:xfrm>
           <a:prstGeom prst="rect">
             <a:avLst/>
@@ -3676,7 +3676,7 @@
         </p:nvSpPr>
         <p:spPr>
           <a:xfrm>
-            <a:off x="434109" y="434232"/>
+            <a:off x="297917" y="395320"/>
             <a:ext cx="3038764" cy="400110"/>
           </a:xfrm>
           <a:prstGeom prst="rect">
@@ -3752,7 +3752,7 @@
         </p:nvSpPr>
         <p:spPr>
           <a:xfrm>
-            <a:off x="3454400" y="2202750"/>
+            <a:off x="3794877" y="2202750"/>
             <a:ext cx="3038764" cy="400110"/>
           </a:xfrm>
           <a:prstGeom prst="rect">
@@ -3790,7 +3790,7 @@
         </p:nvSpPr>
         <p:spPr>
           <a:xfrm>
-            <a:off x="3463636" y="3677681"/>
+            <a:off x="3804113" y="3677681"/>
             <a:ext cx="3038764" cy="400110"/>
           </a:xfrm>
           <a:prstGeom prst="rect">
@@ -3828,7 +3828,7 @@
         </p:nvSpPr>
         <p:spPr>
           <a:xfrm>
-            <a:off x="3463636" y="5135339"/>
+            <a:off x="3804113" y="5135339"/>
             <a:ext cx="3038764" cy="400110"/>
           </a:xfrm>
           <a:prstGeom prst="rect">
@@ -3867,7 +3867,7 @@
         <p:spPr>
           <a:xfrm>
             <a:off x="424873" y="3518859"/>
-            <a:ext cx="3038764" cy="400110"/>
+            <a:ext cx="1002639" cy="400110"/>
           </a:xfrm>
           <a:prstGeom prst="rect">
             <a:avLst/>
@@ -4076,30 +4076,537 @@
       </p:cxnSp>
       <p:sp>
         <p:nvSpPr>
-          <p:cNvPr id="19" name="Ellipse 18">
-            <a:extLst>
-              <a:ext uri="{FF2B5EF4-FFF2-40B4-BE49-F238E27FC236}">
-                <a16:creationId xmlns:a16="http://schemas.microsoft.com/office/drawing/2014/main" id="{B620675E-54D2-2AE8-7CA2-BDF81C168FC8}"/>
-              </a:ext>
-            </a:extLst>
-          </p:cNvPr>
-          <p:cNvSpPr/>
+          <p:cNvPr id="20" name="Textfeld 19">
+            <a:extLst>
+              <a:ext uri="{FF2B5EF4-FFF2-40B4-BE49-F238E27FC236}">
+                <a16:creationId xmlns:a16="http://schemas.microsoft.com/office/drawing/2014/main" id="{CEC3C4F9-FCD0-53E8-65B8-C166C0CDBE0A}"/>
+              </a:ext>
+            </a:extLst>
+          </p:cNvPr>
+          <p:cNvSpPr txBox="1"/>
           <p:nvPr/>
         </p:nvSpPr>
         <p:spPr>
           <a:xfrm>
-            <a:off x="2613891" y="803564"/>
-            <a:ext cx="7435273" cy="568132"/>
+            <a:off x="3910332" y="2830634"/>
+            <a:ext cx="4668982" cy="400110"/>
           </a:xfrm>
-          <a:prstGeom prst="ellipse">
+          <a:prstGeom prst="rect">
             <a:avLst/>
           </a:prstGeom>
           <a:noFill/>
-          <a:ln w="12700">
-            <a:solidFill>
-              <a:schemeClr val="tx1"/>
-            </a:solidFill>
-          </a:ln>
+        </p:spPr>
+        <p:txBody>
+          <a:bodyPr wrap="square" rtlCol="0">
+            <a:spAutoFit/>
+          </a:bodyPr>
+          <a:lstStyle/>
+          <a:p>
+            <a:r>
+              <a:rPr lang="de-DE" sz="2000" dirty="0">
+                <a:latin typeface="Arial" panose="020B0604020202020204" pitchFamily="34" charset="0"/>
+                <a:cs typeface="Arial" panose="020B0604020202020204" pitchFamily="34" charset="0"/>
+              </a:rPr>
+              <a:t>Button- und Keyboard – Events -&gt;()</a:t>
+            </a:r>
+          </a:p>
+        </p:txBody>
+      </p:sp>
+      <p:sp>
+        <p:nvSpPr>
+          <p:cNvPr id="21" name="Textfeld 20">
+            <a:extLst>
+              <a:ext uri="{FF2B5EF4-FFF2-40B4-BE49-F238E27FC236}">
+                <a16:creationId xmlns:a16="http://schemas.microsoft.com/office/drawing/2014/main" id="{BFB657C0-CC51-A8AA-8FF1-94D2A44D729C}"/>
+              </a:ext>
+            </a:extLst>
+          </p:cNvPr>
+          <p:cNvSpPr txBox="1"/>
+          <p:nvPr/>
+        </p:nvSpPr>
+        <p:spPr>
+          <a:xfrm>
+            <a:off x="3910332" y="4315180"/>
+            <a:ext cx="2350654" cy="400110"/>
+          </a:xfrm>
+          <a:prstGeom prst="rect">
+            <a:avLst/>
+          </a:prstGeom>
+          <a:noFill/>
+        </p:spPr>
+        <p:txBody>
+          <a:bodyPr wrap="square" rtlCol="0">
+            <a:spAutoFit/>
+          </a:bodyPr>
+          <a:lstStyle/>
+          <a:p>
+            <a:r>
+              <a:rPr lang="de-DE" sz="2000" dirty="0">
+                <a:latin typeface="Arial" panose="020B0604020202020204" pitchFamily="34" charset="0"/>
+                <a:cs typeface="Arial" panose="020B0604020202020204" pitchFamily="34" charset="0"/>
+              </a:rPr>
+              <a:t>THREE Audio API</a:t>
+            </a:r>
+          </a:p>
+        </p:txBody>
+      </p:sp>
+      <p:sp>
+        <p:nvSpPr>
+          <p:cNvPr id="22" name="Textfeld 21">
+            <a:extLst>
+              <a:ext uri="{FF2B5EF4-FFF2-40B4-BE49-F238E27FC236}">
+                <a16:creationId xmlns:a16="http://schemas.microsoft.com/office/drawing/2014/main" id="{40332A2B-A8EA-AEC6-B858-B2153953BAEB}"/>
+              </a:ext>
+            </a:extLst>
+          </p:cNvPr>
+          <p:cNvSpPr txBox="1"/>
+          <p:nvPr/>
+        </p:nvSpPr>
+        <p:spPr>
+          <a:xfrm>
+            <a:off x="6092913" y="4182994"/>
+            <a:ext cx="1941455" cy="646331"/>
+          </a:xfrm>
+          <a:prstGeom prst="rect">
+            <a:avLst/>
+          </a:prstGeom>
+          <a:noFill/>
+        </p:spPr>
+        <p:txBody>
+          <a:bodyPr wrap="square" rtlCol="0">
+            <a:spAutoFit/>
+          </a:bodyPr>
+          <a:lstStyle/>
+          <a:p>
+            <a:r>
+              <a:rPr lang="de-DE" dirty="0">
+                <a:latin typeface="Arial" panose="020B0604020202020204" pitchFamily="34" charset="0"/>
+                <a:cs typeface="Arial" panose="020B0604020202020204" pitchFamily="34" charset="0"/>
+              </a:rPr>
+              <a:t>Spielen, Pause, </a:t>
+            </a:r>
+            <a:r>
+              <a:rPr lang="de-DE" dirty="0" err="1">
+                <a:latin typeface="Arial" panose="020B0604020202020204" pitchFamily="34" charset="0"/>
+                <a:cs typeface="Arial" panose="020B0604020202020204" pitchFamily="34" charset="0"/>
+              </a:rPr>
+              <a:t>Stop</a:t>
+            </a:r>
+            <a:r>
+              <a:rPr lang="de-DE" dirty="0">
+                <a:latin typeface="Arial" panose="020B0604020202020204" pitchFamily="34" charset="0"/>
+                <a:cs typeface="Arial" panose="020B0604020202020204" pitchFamily="34" charset="0"/>
+              </a:rPr>
+              <a:t>, Laden</a:t>
+            </a:r>
+            <a:endParaRPr lang="de-DE" sz="2400" dirty="0">
+              <a:latin typeface="Arial" panose="020B0604020202020204" pitchFamily="34" charset="0"/>
+              <a:cs typeface="Arial" panose="020B0604020202020204" pitchFamily="34" charset="0"/>
+            </a:endParaRPr>
+          </a:p>
+        </p:txBody>
+      </p:sp>
+      <p:sp>
+        <p:nvSpPr>
+          <p:cNvPr id="23" name="Textfeld 22">
+            <a:extLst>
+              <a:ext uri="{FF2B5EF4-FFF2-40B4-BE49-F238E27FC236}">
+                <a16:creationId xmlns:a16="http://schemas.microsoft.com/office/drawing/2014/main" id="{32135CED-EA4D-610B-3A6C-24236F122764}"/>
+              </a:ext>
+            </a:extLst>
+          </p:cNvPr>
+          <p:cNvSpPr txBox="1"/>
+          <p:nvPr/>
+        </p:nvSpPr>
+        <p:spPr>
+          <a:xfrm>
+            <a:off x="8152623" y="4307742"/>
+            <a:ext cx="1069207" cy="369332"/>
+          </a:xfrm>
+          <a:prstGeom prst="rect">
+            <a:avLst/>
+          </a:prstGeom>
+          <a:noFill/>
+        </p:spPr>
+        <p:txBody>
+          <a:bodyPr wrap="square" rtlCol="0">
+            <a:spAutoFit/>
+          </a:bodyPr>
+          <a:lstStyle/>
+          <a:p>
+            <a:r>
+              <a:rPr lang="de-DE" dirty="0">
+                <a:latin typeface="Arial" panose="020B0604020202020204" pitchFamily="34" charset="0"/>
+                <a:cs typeface="Arial" panose="020B0604020202020204" pitchFamily="34" charset="0"/>
+              </a:rPr>
+              <a:t>Analyse</a:t>
+            </a:r>
+            <a:endParaRPr lang="de-DE" sz="2000" dirty="0">
+              <a:latin typeface="Arial" panose="020B0604020202020204" pitchFamily="34" charset="0"/>
+              <a:cs typeface="Arial" panose="020B0604020202020204" pitchFamily="34" charset="0"/>
+            </a:endParaRPr>
+          </a:p>
+        </p:txBody>
+      </p:sp>
+      <p:sp>
+        <p:nvSpPr>
+          <p:cNvPr id="24" name="Textfeld 23">
+            <a:extLst>
+              <a:ext uri="{FF2B5EF4-FFF2-40B4-BE49-F238E27FC236}">
+                <a16:creationId xmlns:a16="http://schemas.microsoft.com/office/drawing/2014/main" id="{7DA9484C-7D97-8957-85A9-988F85685D25}"/>
+              </a:ext>
+            </a:extLst>
+          </p:cNvPr>
+          <p:cNvSpPr txBox="1"/>
+          <p:nvPr/>
+        </p:nvSpPr>
+        <p:spPr>
+          <a:xfrm>
+            <a:off x="9614032" y="4315180"/>
+            <a:ext cx="1208736" cy="369332"/>
+          </a:xfrm>
+          <a:prstGeom prst="rect">
+            <a:avLst/>
+          </a:prstGeom>
+          <a:noFill/>
+        </p:spPr>
+        <p:txBody>
+          <a:bodyPr wrap="square" rtlCol="0">
+            <a:spAutoFit/>
+          </a:bodyPr>
+          <a:lstStyle/>
+          <a:p>
+            <a:r>
+              <a:rPr lang="de-DE" dirty="0" err="1">
+                <a:latin typeface="Arial" panose="020B0604020202020204" pitchFamily="34" charset="0"/>
+                <a:cs typeface="Arial" panose="020B0604020202020204" pitchFamily="34" charset="0"/>
+              </a:rPr>
+              <a:t>Visualize</a:t>
+            </a:r>
+            <a:endParaRPr lang="de-DE" sz="2000" dirty="0">
+              <a:latin typeface="Arial" panose="020B0604020202020204" pitchFamily="34" charset="0"/>
+              <a:cs typeface="Arial" panose="020B0604020202020204" pitchFamily="34" charset="0"/>
+            </a:endParaRPr>
+          </a:p>
+        </p:txBody>
+      </p:sp>
+      <p:sp>
+        <p:nvSpPr>
+          <p:cNvPr id="25" name="Textfeld 24">
+            <a:extLst>
+              <a:ext uri="{FF2B5EF4-FFF2-40B4-BE49-F238E27FC236}">
+                <a16:creationId xmlns:a16="http://schemas.microsoft.com/office/drawing/2014/main" id="{7AF2B9B0-7F50-8660-7005-2D9B57602F45}"/>
+              </a:ext>
+            </a:extLst>
+          </p:cNvPr>
+          <p:cNvSpPr txBox="1"/>
+          <p:nvPr/>
+        </p:nvSpPr>
+        <p:spPr>
+          <a:xfrm>
+            <a:off x="1733934" y="4917642"/>
+            <a:ext cx="1307493" cy="400110"/>
+          </a:xfrm>
+          <a:prstGeom prst="rect">
+            <a:avLst/>
+          </a:prstGeom>
+          <a:noFill/>
+        </p:spPr>
+        <p:txBody>
+          <a:bodyPr wrap="square" rtlCol="0">
+            <a:spAutoFit/>
+          </a:bodyPr>
+          <a:lstStyle/>
+          <a:p>
+            <a:r>
+              <a:rPr lang="de-DE" sz="2000" dirty="0" err="1">
+                <a:latin typeface="Arial" panose="020B0604020202020204" pitchFamily="34" charset="0"/>
+                <a:cs typeface="Arial" panose="020B0604020202020204" pitchFamily="34" charset="0"/>
+              </a:rPr>
+              <a:t>Animate</a:t>
+            </a:r>
+            <a:r>
+              <a:rPr lang="de-DE" sz="2000" dirty="0">
+                <a:latin typeface="Arial" panose="020B0604020202020204" pitchFamily="34" charset="0"/>
+                <a:cs typeface="Arial" panose="020B0604020202020204" pitchFamily="34" charset="0"/>
+              </a:rPr>
+              <a:t>()</a:t>
+            </a:r>
+          </a:p>
+        </p:txBody>
+      </p:sp>
+      <p:sp>
+        <p:nvSpPr>
+          <p:cNvPr id="26" name="Textfeld 25">
+            <a:extLst>
+              <a:ext uri="{FF2B5EF4-FFF2-40B4-BE49-F238E27FC236}">
+                <a16:creationId xmlns:a16="http://schemas.microsoft.com/office/drawing/2014/main" id="{4E93B145-EB2D-CB8D-7538-FE8DF37D369E}"/>
+              </a:ext>
+            </a:extLst>
+          </p:cNvPr>
+          <p:cNvSpPr txBox="1"/>
+          <p:nvPr/>
+        </p:nvSpPr>
+        <p:spPr>
+          <a:xfrm>
+            <a:off x="3894168" y="5772038"/>
+            <a:ext cx="7132781" cy="400110"/>
+          </a:xfrm>
+          <a:prstGeom prst="rect">
+            <a:avLst/>
+          </a:prstGeom>
+          <a:noFill/>
+        </p:spPr>
+        <p:txBody>
+          <a:bodyPr wrap="square" rtlCol="0">
+            <a:spAutoFit/>
+          </a:bodyPr>
+          <a:lstStyle/>
+          <a:p>
+            <a:r>
+              <a:rPr lang="de-DE" sz="2000" dirty="0">
+                <a:latin typeface="Arial" panose="020B0604020202020204" pitchFamily="34" charset="0"/>
+                <a:cs typeface="Arial" panose="020B0604020202020204" pitchFamily="34" charset="0"/>
+              </a:rPr>
+              <a:t>Create(), </a:t>
+            </a:r>
+            <a:r>
+              <a:rPr lang="de-DE" sz="2000" dirty="0" err="1">
+                <a:latin typeface="Arial" panose="020B0604020202020204" pitchFamily="34" charset="0"/>
+                <a:cs typeface="Arial" panose="020B0604020202020204" pitchFamily="34" charset="0"/>
+              </a:rPr>
+              <a:t>animate_visualisation</a:t>
+            </a:r>
+            <a:r>
+              <a:rPr lang="de-DE" sz="2000" dirty="0">
+                <a:latin typeface="Arial" panose="020B0604020202020204" pitchFamily="34" charset="0"/>
+                <a:cs typeface="Arial" panose="020B0604020202020204" pitchFamily="34" charset="0"/>
+              </a:rPr>
+              <a:t>(), </a:t>
+            </a:r>
+            <a:r>
+              <a:rPr lang="de-DE" sz="2000" dirty="0" err="1">
+                <a:latin typeface="Arial" panose="020B0604020202020204" pitchFamily="34" charset="0"/>
+                <a:cs typeface="Arial" panose="020B0604020202020204" pitchFamily="34" charset="0"/>
+              </a:rPr>
+              <a:t>animate_idle</a:t>
+            </a:r>
+            <a:r>
+              <a:rPr lang="de-DE" sz="2000" dirty="0">
+                <a:latin typeface="Arial" panose="020B0604020202020204" pitchFamily="34" charset="0"/>
+                <a:cs typeface="Arial" panose="020B0604020202020204" pitchFamily="34" charset="0"/>
+              </a:rPr>
+              <a:t>(), </a:t>
+            </a:r>
+            <a:r>
+              <a:rPr lang="de-DE" sz="2000" dirty="0" err="1">
+                <a:latin typeface="Arial" panose="020B0604020202020204" pitchFamily="34" charset="0"/>
+                <a:cs typeface="Arial" panose="020B0604020202020204" pitchFamily="34" charset="0"/>
+              </a:rPr>
+              <a:t>Reset</a:t>
+            </a:r>
+            <a:r>
+              <a:rPr lang="de-DE" sz="2000" dirty="0">
+                <a:latin typeface="Arial" panose="020B0604020202020204" pitchFamily="34" charset="0"/>
+                <a:cs typeface="Arial" panose="020B0604020202020204" pitchFamily="34" charset="0"/>
+              </a:rPr>
+              <a:t>()</a:t>
+            </a:r>
+          </a:p>
+        </p:txBody>
+      </p:sp>
+      <p:sp>
+        <p:nvSpPr>
+          <p:cNvPr id="27" name="Textfeld 26">
+            <a:extLst>
+              <a:ext uri="{FF2B5EF4-FFF2-40B4-BE49-F238E27FC236}">
+                <a16:creationId xmlns:a16="http://schemas.microsoft.com/office/drawing/2014/main" id="{E9420FC1-3212-18FD-4051-280BB32EB23F}"/>
+              </a:ext>
+            </a:extLst>
+          </p:cNvPr>
+          <p:cNvSpPr txBox="1"/>
+          <p:nvPr/>
+        </p:nvSpPr>
+        <p:spPr>
+          <a:xfrm>
+            <a:off x="1733934" y="4248817"/>
+            <a:ext cx="1307493" cy="400110"/>
+          </a:xfrm>
+          <a:prstGeom prst="rect">
+            <a:avLst/>
+          </a:prstGeom>
+          <a:noFill/>
+        </p:spPr>
+        <p:txBody>
+          <a:bodyPr wrap="square" rtlCol="0">
+            <a:spAutoFit/>
+          </a:bodyPr>
+          <a:lstStyle/>
+          <a:p>
+            <a:r>
+              <a:rPr lang="de-DE" sz="2000" dirty="0">
+                <a:latin typeface="Arial" panose="020B0604020202020204" pitchFamily="34" charset="0"/>
+                <a:cs typeface="Arial" panose="020B0604020202020204" pitchFamily="34" charset="0"/>
+              </a:rPr>
+              <a:t>Renderer</a:t>
+            </a:r>
+          </a:p>
+        </p:txBody>
+      </p:sp>
+      <p:sp>
+        <p:nvSpPr>
+          <p:cNvPr id="28" name="Textfeld 27">
+            <a:extLst>
+              <a:ext uri="{FF2B5EF4-FFF2-40B4-BE49-F238E27FC236}">
+                <a16:creationId xmlns:a16="http://schemas.microsoft.com/office/drawing/2014/main" id="{55300E9A-E197-B728-7C96-8525988E9528}"/>
+              </a:ext>
+            </a:extLst>
+          </p:cNvPr>
+          <p:cNvSpPr txBox="1"/>
+          <p:nvPr/>
+        </p:nvSpPr>
+        <p:spPr>
+          <a:xfrm>
+            <a:off x="1733934" y="3575031"/>
+            <a:ext cx="1826491" cy="400110"/>
+          </a:xfrm>
+          <a:prstGeom prst="rect">
+            <a:avLst/>
+          </a:prstGeom>
+          <a:noFill/>
+        </p:spPr>
+        <p:txBody>
+          <a:bodyPr wrap="square" rtlCol="0">
+            <a:spAutoFit/>
+          </a:bodyPr>
+          <a:lstStyle/>
+          <a:p>
+            <a:r>
+              <a:rPr lang="de-DE" sz="2000" dirty="0">
+                <a:latin typeface="Arial" panose="020B0604020202020204" pitchFamily="34" charset="0"/>
+                <a:cs typeface="Arial" panose="020B0604020202020204" pitchFamily="34" charset="0"/>
+              </a:rPr>
+              <a:t>Audio </a:t>
+            </a:r>
+            <a:r>
+              <a:rPr lang="de-DE" sz="2000" dirty="0" err="1">
+                <a:latin typeface="Arial" panose="020B0604020202020204" pitchFamily="34" charset="0"/>
+                <a:cs typeface="Arial" panose="020B0604020202020204" pitchFamily="34" charset="0"/>
+              </a:rPr>
+              <a:t>Listener</a:t>
+            </a:r>
+            <a:endParaRPr lang="de-DE" sz="2000" dirty="0">
+              <a:latin typeface="Arial" panose="020B0604020202020204" pitchFamily="34" charset="0"/>
+              <a:cs typeface="Arial" panose="020B0604020202020204" pitchFamily="34" charset="0"/>
+            </a:endParaRPr>
+          </a:p>
+        </p:txBody>
+      </p:sp>
+      <p:sp>
+        <p:nvSpPr>
+          <p:cNvPr id="29" name="Textfeld 28">
+            <a:extLst>
+              <a:ext uri="{FF2B5EF4-FFF2-40B4-BE49-F238E27FC236}">
+                <a16:creationId xmlns:a16="http://schemas.microsoft.com/office/drawing/2014/main" id="{68E0EB02-FD60-F1D2-40F1-FE2BDFD47958}"/>
+              </a:ext>
+            </a:extLst>
+          </p:cNvPr>
+          <p:cNvSpPr txBox="1"/>
+          <p:nvPr/>
+        </p:nvSpPr>
+        <p:spPr>
+          <a:xfrm>
+            <a:off x="1733934" y="2894504"/>
+            <a:ext cx="1413712" cy="400110"/>
+          </a:xfrm>
+          <a:prstGeom prst="rect">
+            <a:avLst/>
+          </a:prstGeom>
+          <a:noFill/>
+        </p:spPr>
+        <p:txBody>
+          <a:bodyPr wrap="square" rtlCol="0">
+            <a:spAutoFit/>
+          </a:bodyPr>
+          <a:lstStyle/>
+          <a:p>
+            <a:r>
+              <a:rPr lang="de-DE" sz="2000" dirty="0" err="1">
+                <a:latin typeface="Arial" panose="020B0604020202020204" pitchFamily="34" charset="0"/>
+                <a:cs typeface="Arial" panose="020B0604020202020204" pitchFamily="34" charset="0"/>
+              </a:rPr>
+              <a:t>Camera</a:t>
+            </a:r>
+            <a:endParaRPr lang="de-DE" sz="2000" dirty="0">
+              <a:latin typeface="Arial" panose="020B0604020202020204" pitchFamily="34" charset="0"/>
+              <a:cs typeface="Arial" panose="020B0604020202020204" pitchFamily="34" charset="0"/>
+            </a:endParaRPr>
+          </a:p>
+        </p:txBody>
+      </p:sp>
+      <p:sp>
+        <p:nvSpPr>
+          <p:cNvPr id="30" name="Textfeld 29">
+            <a:extLst>
+              <a:ext uri="{FF2B5EF4-FFF2-40B4-BE49-F238E27FC236}">
+                <a16:creationId xmlns:a16="http://schemas.microsoft.com/office/drawing/2014/main" id="{EFFCE412-FE39-A0A2-38E7-867C4F9EBCF6}"/>
+              </a:ext>
+            </a:extLst>
+          </p:cNvPr>
+          <p:cNvSpPr txBox="1"/>
+          <p:nvPr/>
+        </p:nvSpPr>
+        <p:spPr>
+          <a:xfrm>
+            <a:off x="1733934" y="2321111"/>
+            <a:ext cx="1087727" cy="400110"/>
+          </a:xfrm>
+          <a:prstGeom prst="rect">
+            <a:avLst/>
+          </a:prstGeom>
+          <a:noFill/>
+        </p:spPr>
+        <p:txBody>
+          <a:bodyPr wrap="square" rtlCol="0">
+            <a:spAutoFit/>
+          </a:bodyPr>
+          <a:lstStyle/>
+          <a:p>
+            <a:r>
+              <a:rPr lang="de-DE" sz="2000" dirty="0">
+                <a:latin typeface="Arial" panose="020B0604020202020204" pitchFamily="34" charset="0"/>
+                <a:cs typeface="Arial" panose="020B0604020202020204" pitchFamily="34" charset="0"/>
+              </a:rPr>
+              <a:t>Scene</a:t>
+            </a:r>
+          </a:p>
+        </p:txBody>
+      </p:sp>
+      <p:sp>
+        <p:nvSpPr>
+          <p:cNvPr id="8" name="Rechteck: obere Ecken abgerundet 7">
+            <a:extLst>
+              <a:ext uri="{FF2B5EF4-FFF2-40B4-BE49-F238E27FC236}">
+                <a16:creationId xmlns:a16="http://schemas.microsoft.com/office/drawing/2014/main" id="{D69D8784-85F7-32B6-79EB-3ACD7AE40168}"/>
+              </a:ext>
+            </a:extLst>
+          </p:cNvPr>
+          <p:cNvSpPr/>
+          <p:nvPr/>
+        </p:nvSpPr>
+        <p:spPr>
+          <a:xfrm>
+            <a:off x="2387680" y="814869"/>
+            <a:ext cx="7405852" cy="575698"/>
+          </a:xfrm>
+          <a:prstGeom prst="round2SameRect">
+            <a:avLst>
+              <a:gd name="adj1" fmla="val 0"/>
+              <a:gd name="adj2" fmla="val 50000"/>
+            </a:avLst>
+          </a:prstGeom>
+          <a:noFill/>
+          <a:ln w="19050"/>
         </p:spPr>
         <p:style>
           <a:lnRef idx="2">
@@ -4139,514 +4646,6 @@
               <a:latin typeface="Arial" panose="020B0604020202020204" pitchFamily="34" charset="0"/>
               <a:cs typeface="Arial" panose="020B0604020202020204" pitchFamily="34" charset="0"/>
             </a:endParaRPr>
-          </a:p>
-        </p:txBody>
-      </p:sp>
-      <p:sp>
-        <p:nvSpPr>
-          <p:cNvPr id="20" name="Textfeld 19">
-            <a:extLst>
-              <a:ext uri="{FF2B5EF4-FFF2-40B4-BE49-F238E27FC236}">
-                <a16:creationId xmlns:a16="http://schemas.microsoft.com/office/drawing/2014/main" id="{CEC3C4F9-FCD0-53E8-65B8-C166C0CDBE0A}"/>
-              </a:ext>
-            </a:extLst>
-          </p:cNvPr>
-          <p:cNvSpPr txBox="1"/>
-          <p:nvPr/>
-        </p:nvSpPr>
-        <p:spPr>
-          <a:xfrm>
-            <a:off x="3569855" y="2830634"/>
-            <a:ext cx="4668982" cy="400110"/>
-          </a:xfrm>
-          <a:prstGeom prst="rect">
-            <a:avLst/>
-          </a:prstGeom>
-          <a:noFill/>
-        </p:spPr>
-        <p:txBody>
-          <a:bodyPr wrap="square" rtlCol="0">
-            <a:spAutoFit/>
-          </a:bodyPr>
-          <a:lstStyle/>
-          <a:p>
-            <a:r>
-              <a:rPr lang="de-DE" sz="2000" dirty="0">
-                <a:latin typeface="Arial" panose="020B0604020202020204" pitchFamily="34" charset="0"/>
-                <a:cs typeface="Arial" panose="020B0604020202020204" pitchFamily="34" charset="0"/>
-              </a:rPr>
-              <a:t>Button- und Keyboard – Events -&gt;()</a:t>
-            </a:r>
-          </a:p>
-        </p:txBody>
-      </p:sp>
-      <p:sp>
-        <p:nvSpPr>
-          <p:cNvPr id="21" name="Textfeld 20">
-            <a:extLst>
-              <a:ext uri="{FF2B5EF4-FFF2-40B4-BE49-F238E27FC236}">
-                <a16:creationId xmlns:a16="http://schemas.microsoft.com/office/drawing/2014/main" id="{BFB657C0-CC51-A8AA-8FF1-94D2A44D729C}"/>
-              </a:ext>
-            </a:extLst>
-          </p:cNvPr>
-          <p:cNvSpPr txBox="1"/>
-          <p:nvPr/>
-        </p:nvSpPr>
-        <p:spPr>
-          <a:xfrm>
-            <a:off x="3569855" y="4315180"/>
-            <a:ext cx="2350654" cy="400110"/>
-          </a:xfrm>
-          <a:prstGeom prst="rect">
-            <a:avLst/>
-          </a:prstGeom>
-          <a:noFill/>
-        </p:spPr>
-        <p:txBody>
-          <a:bodyPr wrap="square" rtlCol="0">
-            <a:spAutoFit/>
-          </a:bodyPr>
-          <a:lstStyle/>
-          <a:p>
-            <a:r>
-              <a:rPr lang="de-DE" sz="2000" dirty="0">
-                <a:latin typeface="Arial" panose="020B0604020202020204" pitchFamily="34" charset="0"/>
-                <a:cs typeface="Arial" panose="020B0604020202020204" pitchFamily="34" charset="0"/>
-              </a:rPr>
-              <a:t>THREE Audio API</a:t>
-            </a:r>
-          </a:p>
-        </p:txBody>
-      </p:sp>
-      <p:sp>
-        <p:nvSpPr>
-          <p:cNvPr id="22" name="Textfeld 21">
-            <a:extLst>
-              <a:ext uri="{FF2B5EF4-FFF2-40B4-BE49-F238E27FC236}">
-                <a16:creationId xmlns:a16="http://schemas.microsoft.com/office/drawing/2014/main" id="{40332A2B-A8EA-AEC6-B858-B2153953BAEB}"/>
-              </a:ext>
-            </a:extLst>
-          </p:cNvPr>
-          <p:cNvSpPr txBox="1"/>
-          <p:nvPr/>
-        </p:nvSpPr>
-        <p:spPr>
-          <a:xfrm>
-            <a:off x="5752436" y="4182994"/>
-            <a:ext cx="1941455" cy="646331"/>
-          </a:xfrm>
-          <a:prstGeom prst="rect">
-            <a:avLst/>
-          </a:prstGeom>
-          <a:noFill/>
-        </p:spPr>
-        <p:txBody>
-          <a:bodyPr wrap="square" rtlCol="0">
-            <a:spAutoFit/>
-          </a:bodyPr>
-          <a:lstStyle/>
-          <a:p>
-            <a:r>
-              <a:rPr lang="de-DE" dirty="0">
-                <a:latin typeface="Arial" panose="020B0604020202020204" pitchFamily="34" charset="0"/>
-                <a:cs typeface="Arial" panose="020B0604020202020204" pitchFamily="34" charset="0"/>
-              </a:rPr>
-              <a:t>Spielen, Pause, </a:t>
-            </a:r>
-            <a:r>
-              <a:rPr lang="de-DE" dirty="0" err="1">
-                <a:latin typeface="Arial" panose="020B0604020202020204" pitchFamily="34" charset="0"/>
-                <a:cs typeface="Arial" panose="020B0604020202020204" pitchFamily="34" charset="0"/>
-              </a:rPr>
-              <a:t>Stop</a:t>
-            </a:r>
-            <a:r>
-              <a:rPr lang="de-DE" dirty="0">
-                <a:latin typeface="Arial" panose="020B0604020202020204" pitchFamily="34" charset="0"/>
-                <a:cs typeface="Arial" panose="020B0604020202020204" pitchFamily="34" charset="0"/>
-              </a:rPr>
-              <a:t>, Laden</a:t>
-            </a:r>
-            <a:endParaRPr lang="de-DE" sz="2400" dirty="0">
-              <a:latin typeface="Arial" panose="020B0604020202020204" pitchFamily="34" charset="0"/>
-              <a:cs typeface="Arial" panose="020B0604020202020204" pitchFamily="34" charset="0"/>
-            </a:endParaRPr>
-          </a:p>
-        </p:txBody>
-      </p:sp>
-      <p:sp>
-        <p:nvSpPr>
-          <p:cNvPr id="23" name="Textfeld 22">
-            <a:extLst>
-              <a:ext uri="{FF2B5EF4-FFF2-40B4-BE49-F238E27FC236}">
-                <a16:creationId xmlns:a16="http://schemas.microsoft.com/office/drawing/2014/main" id="{32135CED-EA4D-610B-3A6C-24236F122764}"/>
-              </a:ext>
-            </a:extLst>
-          </p:cNvPr>
-          <p:cNvSpPr txBox="1"/>
-          <p:nvPr/>
-        </p:nvSpPr>
-        <p:spPr>
-          <a:xfrm>
-            <a:off x="7812146" y="4307742"/>
-            <a:ext cx="1941455" cy="369332"/>
-          </a:xfrm>
-          <a:prstGeom prst="rect">
-            <a:avLst/>
-          </a:prstGeom>
-          <a:noFill/>
-        </p:spPr>
-        <p:txBody>
-          <a:bodyPr wrap="square" rtlCol="0">
-            <a:spAutoFit/>
-          </a:bodyPr>
-          <a:lstStyle/>
-          <a:p>
-            <a:r>
-              <a:rPr lang="de-DE" dirty="0">
-                <a:latin typeface="Arial" panose="020B0604020202020204" pitchFamily="34" charset="0"/>
-                <a:cs typeface="Arial" panose="020B0604020202020204" pitchFamily="34" charset="0"/>
-              </a:rPr>
-              <a:t>Analyse</a:t>
-            </a:r>
-            <a:endParaRPr lang="de-DE" sz="2000" dirty="0">
-              <a:latin typeface="Arial" panose="020B0604020202020204" pitchFamily="34" charset="0"/>
-              <a:cs typeface="Arial" panose="020B0604020202020204" pitchFamily="34" charset="0"/>
-            </a:endParaRPr>
-          </a:p>
-        </p:txBody>
-      </p:sp>
-      <p:sp>
-        <p:nvSpPr>
-          <p:cNvPr id="24" name="Textfeld 23">
-            <a:extLst>
-              <a:ext uri="{FF2B5EF4-FFF2-40B4-BE49-F238E27FC236}">
-                <a16:creationId xmlns:a16="http://schemas.microsoft.com/office/drawing/2014/main" id="{7DA9484C-7D97-8957-85A9-988F85685D25}"/>
-              </a:ext>
-            </a:extLst>
-          </p:cNvPr>
-          <p:cNvSpPr txBox="1"/>
-          <p:nvPr/>
-        </p:nvSpPr>
-        <p:spPr>
-          <a:xfrm>
-            <a:off x="9293010" y="4315180"/>
-            <a:ext cx="1941455" cy="369332"/>
-          </a:xfrm>
-          <a:prstGeom prst="rect">
-            <a:avLst/>
-          </a:prstGeom>
-          <a:noFill/>
-        </p:spPr>
-        <p:txBody>
-          <a:bodyPr wrap="square" rtlCol="0">
-            <a:spAutoFit/>
-          </a:bodyPr>
-          <a:lstStyle/>
-          <a:p>
-            <a:r>
-              <a:rPr lang="de-DE" dirty="0" err="1">
-                <a:latin typeface="Arial" panose="020B0604020202020204" pitchFamily="34" charset="0"/>
-                <a:cs typeface="Arial" panose="020B0604020202020204" pitchFamily="34" charset="0"/>
-              </a:rPr>
-              <a:t>Visualize</a:t>
-            </a:r>
-            <a:endParaRPr lang="de-DE" sz="2000" dirty="0">
-              <a:latin typeface="Arial" panose="020B0604020202020204" pitchFamily="34" charset="0"/>
-              <a:cs typeface="Arial" panose="020B0604020202020204" pitchFamily="34" charset="0"/>
-            </a:endParaRPr>
-          </a:p>
-        </p:txBody>
-      </p:sp>
-      <p:sp>
-        <p:nvSpPr>
-          <p:cNvPr id="25" name="Textfeld 24">
-            <a:extLst>
-              <a:ext uri="{FF2B5EF4-FFF2-40B4-BE49-F238E27FC236}">
-                <a16:creationId xmlns:a16="http://schemas.microsoft.com/office/drawing/2014/main" id="{7AF2B9B0-7F50-8660-7005-2D9B57602F45}"/>
-              </a:ext>
-            </a:extLst>
-          </p:cNvPr>
-          <p:cNvSpPr txBox="1"/>
-          <p:nvPr/>
-        </p:nvSpPr>
-        <p:spPr>
-          <a:xfrm>
-            <a:off x="1923719" y="5704726"/>
-            <a:ext cx="2350654" cy="400110"/>
-          </a:xfrm>
-          <a:prstGeom prst="rect">
-            <a:avLst/>
-          </a:prstGeom>
-          <a:noFill/>
-        </p:spPr>
-        <p:txBody>
-          <a:bodyPr wrap="square" rtlCol="0">
-            <a:spAutoFit/>
-          </a:bodyPr>
-          <a:lstStyle/>
-          <a:p>
-            <a:r>
-              <a:rPr lang="de-DE" sz="2000" dirty="0" err="1">
-                <a:latin typeface="Arial" panose="020B0604020202020204" pitchFamily="34" charset="0"/>
-                <a:cs typeface="Arial" panose="020B0604020202020204" pitchFamily="34" charset="0"/>
-              </a:rPr>
-              <a:t>Animate</a:t>
-            </a:r>
-            <a:r>
-              <a:rPr lang="de-DE" sz="2000" dirty="0">
-                <a:latin typeface="Arial" panose="020B0604020202020204" pitchFamily="34" charset="0"/>
-                <a:cs typeface="Arial" panose="020B0604020202020204" pitchFamily="34" charset="0"/>
-              </a:rPr>
-              <a:t>()</a:t>
-            </a:r>
-          </a:p>
-        </p:txBody>
-      </p:sp>
-      <p:sp>
-        <p:nvSpPr>
-          <p:cNvPr id="26" name="Textfeld 25">
-            <a:extLst>
-              <a:ext uri="{FF2B5EF4-FFF2-40B4-BE49-F238E27FC236}">
-                <a16:creationId xmlns:a16="http://schemas.microsoft.com/office/drawing/2014/main" id="{4E93B145-EB2D-CB8D-7538-FE8DF37D369E}"/>
-              </a:ext>
-            </a:extLst>
-          </p:cNvPr>
-          <p:cNvSpPr txBox="1"/>
-          <p:nvPr/>
-        </p:nvSpPr>
-        <p:spPr>
-          <a:xfrm>
-            <a:off x="3553691" y="5772038"/>
-            <a:ext cx="7132781" cy="400110"/>
-          </a:xfrm>
-          <a:prstGeom prst="rect">
-            <a:avLst/>
-          </a:prstGeom>
-          <a:noFill/>
-        </p:spPr>
-        <p:txBody>
-          <a:bodyPr wrap="square" rtlCol="0">
-            <a:spAutoFit/>
-          </a:bodyPr>
-          <a:lstStyle/>
-          <a:p>
-            <a:r>
-              <a:rPr lang="de-DE" sz="2000" dirty="0">
-                <a:latin typeface="Arial" panose="020B0604020202020204" pitchFamily="34" charset="0"/>
-                <a:cs typeface="Arial" panose="020B0604020202020204" pitchFamily="34" charset="0"/>
-              </a:rPr>
-              <a:t>Create(), </a:t>
-            </a:r>
-            <a:r>
-              <a:rPr lang="de-DE" sz="2000" dirty="0" err="1">
-                <a:latin typeface="Arial" panose="020B0604020202020204" pitchFamily="34" charset="0"/>
-                <a:cs typeface="Arial" panose="020B0604020202020204" pitchFamily="34" charset="0"/>
-              </a:rPr>
-              <a:t>animate_visualisation</a:t>
-            </a:r>
-            <a:r>
-              <a:rPr lang="de-DE" sz="2000" dirty="0">
-                <a:latin typeface="Arial" panose="020B0604020202020204" pitchFamily="34" charset="0"/>
-                <a:cs typeface="Arial" panose="020B0604020202020204" pitchFamily="34" charset="0"/>
-              </a:rPr>
-              <a:t>(), </a:t>
-            </a:r>
-            <a:r>
-              <a:rPr lang="de-DE" sz="2000" dirty="0" err="1">
-                <a:latin typeface="Arial" panose="020B0604020202020204" pitchFamily="34" charset="0"/>
-                <a:cs typeface="Arial" panose="020B0604020202020204" pitchFamily="34" charset="0"/>
-              </a:rPr>
-              <a:t>animate_idle</a:t>
-            </a:r>
-            <a:r>
-              <a:rPr lang="de-DE" sz="2000" dirty="0">
-                <a:latin typeface="Arial" panose="020B0604020202020204" pitchFamily="34" charset="0"/>
-                <a:cs typeface="Arial" panose="020B0604020202020204" pitchFamily="34" charset="0"/>
-              </a:rPr>
-              <a:t>(), </a:t>
-            </a:r>
-            <a:r>
-              <a:rPr lang="de-DE" sz="2000" dirty="0" err="1">
-                <a:latin typeface="Arial" panose="020B0604020202020204" pitchFamily="34" charset="0"/>
-                <a:cs typeface="Arial" panose="020B0604020202020204" pitchFamily="34" charset="0"/>
-              </a:rPr>
-              <a:t>Reset</a:t>
-            </a:r>
-            <a:r>
-              <a:rPr lang="de-DE" sz="2000" dirty="0">
-                <a:latin typeface="Arial" panose="020B0604020202020204" pitchFamily="34" charset="0"/>
-                <a:cs typeface="Arial" panose="020B0604020202020204" pitchFamily="34" charset="0"/>
-              </a:rPr>
-              <a:t>()</a:t>
-            </a:r>
-          </a:p>
-        </p:txBody>
-      </p:sp>
-      <p:sp>
-        <p:nvSpPr>
-          <p:cNvPr id="27" name="Textfeld 26">
-            <a:extLst>
-              <a:ext uri="{FF2B5EF4-FFF2-40B4-BE49-F238E27FC236}">
-                <a16:creationId xmlns:a16="http://schemas.microsoft.com/office/drawing/2014/main" id="{E9420FC1-3212-18FD-4051-280BB32EB23F}"/>
-              </a:ext>
-            </a:extLst>
-          </p:cNvPr>
-          <p:cNvSpPr txBox="1"/>
-          <p:nvPr/>
-        </p:nvSpPr>
-        <p:spPr>
-          <a:xfrm>
-            <a:off x="1896505" y="5027222"/>
-            <a:ext cx="2350654" cy="400110"/>
-          </a:xfrm>
-          <a:prstGeom prst="rect">
-            <a:avLst/>
-          </a:prstGeom>
-          <a:noFill/>
-        </p:spPr>
-        <p:txBody>
-          <a:bodyPr wrap="square" rtlCol="0">
-            <a:spAutoFit/>
-          </a:bodyPr>
-          <a:lstStyle/>
-          <a:p>
-            <a:r>
-              <a:rPr lang="de-DE" sz="2000" dirty="0">
-                <a:latin typeface="Arial" panose="020B0604020202020204" pitchFamily="34" charset="0"/>
-                <a:cs typeface="Arial" panose="020B0604020202020204" pitchFamily="34" charset="0"/>
-              </a:rPr>
-              <a:t>Renderer</a:t>
-            </a:r>
-          </a:p>
-        </p:txBody>
-      </p:sp>
-      <p:sp>
-        <p:nvSpPr>
-          <p:cNvPr id="28" name="Textfeld 27">
-            <a:extLst>
-              <a:ext uri="{FF2B5EF4-FFF2-40B4-BE49-F238E27FC236}">
-                <a16:creationId xmlns:a16="http://schemas.microsoft.com/office/drawing/2014/main" id="{55300E9A-E197-B728-7C96-8525988E9528}"/>
-              </a:ext>
-            </a:extLst>
-          </p:cNvPr>
-          <p:cNvSpPr txBox="1"/>
-          <p:nvPr/>
-        </p:nvSpPr>
-        <p:spPr>
-          <a:xfrm>
-            <a:off x="1654096" y="4411093"/>
-            <a:ext cx="2350654" cy="400110"/>
-          </a:xfrm>
-          <a:prstGeom prst="rect">
-            <a:avLst/>
-          </a:prstGeom>
-          <a:noFill/>
-        </p:spPr>
-        <p:txBody>
-          <a:bodyPr wrap="square" rtlCol="0">
-            <a:spAutoFit/>
-          </a:bodyPr>
-          <a:lstStyle/>
-          <a:p>
-            <a:r>
-              <a:rPr lang="de-DE" sz="2000" dirty="0">
-                <a:latin typeface="Arial" panose="020B0604020202020204" pitchFamily="34" charset="0"/>
-                <a:cs typeface="Arial" panose="020B0604020202020204" pitchFamily="34" charset="0"/>
-              </a:rPr>
-              <a:t>Audio </a:t>
-            </a:r>
-            <a:r>
-              <a:rPr lang="de-DE" sz="2000" dirty="0" err="1">
-                <a:latin typeface="Arial" panose="020B0604020202020204" pitchFamily="34" charset="0"/>
-                <a:cs typeface="Arial" panose="020B0604020202020204" pitchFamily="34" charset="0"/>
-              </a:rPr>
-              <a:t>Listener</a:t>
-            </a:r>
-            <a:endParaRPr lang="de-DE" sz="2000" dirty="0">
-              <a:latin typeface="Arial" panose="020B0604020202020204" pitchFamily="34" charset="0"/>
-              <a:cs typeface="Arial" panose="020B0604020202020204" pitchFamily="34" charset="0"/>
-            </a:endParaRPr>
-          </a:p>
-        </p:txBody>
-      </p:sp>
-      <p:sp>
-        <p:nvSpPr>
-          <p:cNvPr id="29" name="Textfeld 28">
-            <a:extLst>
-              <a:ext uri="{FF2B5EF4-FFF2-40B4-BE49-F238E27FC236}">
-                <a16:creationId xmlns:a16="http://schemas.microsoft.com/office/drawing/2014/main" id="{68E0EB02-FD60-F1D2-40F1-FE2BDFD47958}"/>
-              </a:ext>
-            </a:extLst>
-          </p:cNvPr>
-          <p:cNvSpPr txBox="1"/>
-          <p:nvPr/>
-        </p:nvSpPr>
-        <p:spPr>
-          <a:xfrm>
-            <a:off x="1697671" y="3622613"/>
-            <a:ext cx="2350654" cy="400110"/>
-          </a:xfrm>
-          <a:prstGeom prst="rect">
-            <a:avLst/>
-          </a:prstGeom>
-          <a:noFill/>
-        </p:spPr>
-        <p:txBody>
-          <a:bodyPr wrap="square" rtlCol="0">
-            <a:spAutoFit/>
-          </a:bodyPr>
-          <a:lstStyle/>
-          <a:p>
-            <a:r>
-              <a:rPr lang="de-DE" sz="2000" dirty="0" err="1">
-                <a:latin typeface="Arial" panose="020B0604020202020204" pitchFamily="34" charset="0"/>
-                <a:cs typeface="Arial" panose="020B0604020202020204" pitchFamily="34" charset="0"/>
-              </a:rPr>
-              <a:t>Camera</a:t>
-            </a:r>
-            <a:endParaRPr lang="de-DE" sz="2000" dirty="0">
-              <a:latin typeface="Arial" panose="020B0604020202020204" pitchFamily="34" charset="0"/>
-              <a:cs typeface="Arial" panose="020B0604020202020204" pitchFamily="34" charset="0"/>
-            </a:endParaRPr>
-          </a:p>
-        </p:txBody>
-      </p:sp>
-      <p:sp>
-        <p:nvSpPr>
-          <p:cNvPr id="30" name="Textfeld 29">
-            <a:extLst>
-              <a:ext uri="{FF2B5EF4-FFF2-40B4-BE49-F238E27FC236}">
-                <a16:creationId xmlns:a16="http://schemas.microsoft.com/office/drawing/2014/main" id="{EFFCE412-FE39-A0A2-38E7-867C4F9EBCF6}"/>
-              </a:ext>
-            </a:extLst>
-          </p:cNvPr>
-          <p:cNvSpPr txBox="1"/>
-          <p:nvPr/>
-        </p:nvSpPr>
-        <p:spPr>
-          <a:xfrm>
-            <a:off x="1811116" y="2805009"/>
-            <a:ext cx="2350654" cy="400110"/>
-          </a:xfrm>
-          <a:prstGeom prst="rect">
-            <a:avLst/>
-          </a:prstGeom>
-          <a:noFill/>
-        </p:spPr>
-        <p:txBody>
-          <a:bodyPr wrap="square" rtlCol="0">
-            <a:spAutoFit/>
-          </a:bodyPr>
-          <a:lstStyle/>
-          <a:p>
-            <a:r>
-              <a:rPr lang="de-DE" sz="2000" dirty="0">
-                <a:latin typeface="Arial" panose="020B0604020202020204" pitchFamily="34" charset="0"/>
-                <a:cs typeface="Arial" panose="020B0604020202020204" pitchFamily="34" charset="0"/>
-              </a:rPr>
-              <a:t>Scene</a:t>
-            </a:r>
           </a:p>
         </p:txBody>
       </p:sp>
@@ -4682,69 +4681,24 @@
       </p:grpSpPr>
       <p:cxnSp>
         <p:nvCxnSpPr>
-          <p:cNvPr id="30" name="Gerade Verbindung mit Pfeil 29">
-            <a:extLst>
-              <a:ext uri="{FF2B5EF4-FFF2-40B4-BE49-F238E27FC236}">
-                <a16:creationId xmlns:a16="http://schemas.microsoft.com/office/drawing/2014/main" id="{A34D7424-4FAE-08D6-F91F-E0CF2DC318DB}"/>
+          <p:cNvPr id="41" name="Gerade Verbindung mit Pfeil 40">
+            <a:extLst>
+              <a:ext uri="{FF2B5EF4-FFF2-40B4-BE49-F238E27FC236}">
+                <a16:creationId xmlns:a16="http://schemas.microsoft.com/office/drawing/2014/main" id="{232122DE-7A91-1F4D-11B0-E487B60E56EE}"/>
               </a:ext>
             </a:extLst>
           </p:cNvPr>
           <p:cNvCxnSpPr>
             <a:cxnSpLocks/>
-          </p:cNvCxnSpPr>
-          <p:nvPr/>
-        </p:nvCxnSpPr>
-        <p:spPr>
-          <a:xfrm flipH="1">
-            <a:off x="5584317" y="5722872"/>
-            <a:ext cx="1216197" cy="12000"/>
-          </a:xfrm>
-          <a:prstGeom prst="straightConnector1">
-            <a:avLst/>
-          </a:prstGeom>
-          <a:ln w="19050" cap="flat" cmpd="sng" algn="ctr">
-            <a:solidFill>
-              <a:schemeClr val="dk1"/>
-            </a:solidFill>
-            <a:prstDash val="dash"/>
-            <a:round/>
-            <a:headEnd type="none" w="med" len="med"/>
-            <a:tailEnd type="arrow" w="med" len="lg"/>
-          </a:ln>
-        </p:spPr>
-        <p:style>
-          <a:lnRef idx="0">
-            <a:scrgbClr r="0" g="0" b="0"/>
-          </a:lnRef>
-          <a:fillRef idx="0">
-            <a:scrgbClr r="0" g="0" b="0"/>
-          </a:fillRef>
-          <a:effectRef idx="0">
-            <a:scrgbClr r="0" g="0" b="0"/>
-          </a:effectRef>
-          <a:fontRef idx="minor">
-            <a:schemeClr val="tx1"/>
-          </a:fontRef>
-        </p:style>
-      </p:cxnSp>
-      <p:cxnSp>
-        <p:nvCxnSpPr>
-          <p:cNvPr id="41" name="Gerade Verbindung mit Pfeil 40">
-            <a:extLst>
-              <a:ext uri="{FF2B5EF4-FFF2-40B4-BE49-F238E27FC236}">
-                <a16:creationId xmlns:a16="http://schemas.microsoft.com/office/drawing/2014/main" id="{232122DE-7A91-1F4D-11B0-E487B60E56EE}"/>
-              </a:ext>
-            </a:extLst>
-          </p:cNvPr>
-          <p:cNvCxnSpPr>
-            <a:cxnSpLocks/>
+            <a:stCxn id="69" idx="3"/>
+            <a:endCxn id="43" idx="0"/>
           </p:cNvCxnSpPr>
           <p:nvPr/>
         </p:nvCxnSpPr>
         <p:spPr>
           <a:xfrm>
-            <a:off x="7892955" y="3376882"/>
-            <a:ext cx="0" cy="2060377"/>
+            <a:off x="2830749" y="1722370"/>
+            <a:ext cx="3265250" cy="2381664"/>
           </a:xfrm>
           <a:prstGeom prst="straightConnector1">
             <a:avLst/>
@@ -4788,7 +4742,7 @@
         </p:nvGrpSpPr>
         <p:grpSpPr>
           <a:xfrm>
-            <a:off x="5138423" y="2634738"/>
+            <a:off x="5138422" y="4104034"/>
             <a:ext cx="1915152" cy="2111631"/>
             <a:chOff x="537536" y="2441897"/>
             <a:chExt cx="1915152" cy="2111631"/>
@@ -4984,10 +4938,10 @@
         </p:nvGrpSpPr>
         <p:grpSpPr>
           <a:xfrm>
-            <a:off x="360757" y="4067784"/>
-            <a:ext cx="2514179" cy="2111631"/>
-            <a:chOff x="537536" y="2441897"/>
-            <a:chExt cx="1915152" cy="2111631"/>
+            <a:off x="4838910" y="95469"/>
+            <a:ext cx="2514179" cy="2604275"/>
+            <a:chOff x="537537" y="2441897"/>
+            <a:chExt cx="1915152" cy="2604275"/>
           </a:xfrm>
         </p:grpSpPr>
         <p:sp>
@@ -5073,7 +5027,7 @@
           <p:spPr>
             <a:xfrm>
               <a:off x="537537" y="2928939"/>
-              <a:ext cx="1915151" cy="631939"/>
+              <a:ext cx="1915151" cy="229813"/>
             </a:xfrm>
             <a:prstGeom prst="rect">
               <a:avLst/>
@@ -5129,8 +5083,8 @@
           </p:nvSpPr>
           <p:spPr>
             <a:xfrm>
-              <a:off x="537536" y="3560878"/>
-              <a:ext cx="1915152" cy="992650"/>
+              <a:off x="537537" y="3158752"/>
+              <a:ext cx="1915152" cy="1887420"/>
             </a:xfrm>
             <a:prstGeom prst="rect">
               <a:avLst/>
@@ -5162,13 +5116,136 @@
             <a:bodyPr lIns="68580" tIns="34292" rIns="68580" bIns="34292" rtlCol="0" anchor="ctr"/>
             <a:lstStyle/>
             <a:p>
-              <a:endParaRPr lang="de-DE" sz="2000" dirty="0">
-                <a:solidFill>
-                  <a:schemeClr val="tx1"/>
-                </a:solidFill>
-                <a:latin typeface="Arial" panose="020B0604020202020204" pitchFamily="34" charset="0"/>
-                <a:cs typeface="Arial" panose="020B0604020202020204" pitchFamily="34" charset="0"/>
-              </a:endParaRPr>
+              <a:r>
+                <a:rPr lang="de-DE" sz="2000" dirty="0" err="1">
+                  <a:solidFill>
+                    <a:schemeClr val="tx1"/>
+                  </a:solidFill>
+                  <a:latin typeface="Arial" panose="020B0604020202020204" pitchFamily="34" charset="0"/>
+                  <a:cs typeface="Arial" panose="020B0604020202020204" pitchFamily="34" charset="0"/>
+                </a:rPr>
+                <a:t>Load_Music</a:t>
+              </a:r>
+              <a:r>
+                <a:rPr lang="de-DE" sz="2000" dirty="0">
+                  <a:solidFill>
+                    <a:schemeClr val="tx1"/>
+                  </a:solidFill>
+                  <a:latin typeface="Arial" panose="020B0604020202020204" pitchFamily="34" charset="0"/>
+                  <a:cs typeface="Arial" panose="020B0604020202020204" pitchFamily="34" charset="0"/>
+                </a:rPr>
+                <a:t>()</a:t>
+              </a:r>
+            </a:p>
+            <a:p>
+              <a:r>
+                <a:rPr lang="de-DE" sz="2000" dirty="0" err="1">
+                  <a:solidFill>
+                    <a:schemeClr val="tx1"/>
+                  </a:solidFill>
+                  <a:latin typeface="Arial" panose="020B0604020202020204" pitchFamily="34" charset="0"/>
+                  <a:cs typeface="Arial" panose="020B0604020202020204" pitchFamily="34" charset="0"/>
+                </a:rPr>
+                <a:t>Play_Music</a:t>
+              </a:r>
+              <a:r>
+                <a:rPr lang="de-DE" sz="2000" dirty="0">
+                  <a:solidFill>
+                    <a:schemeClr val="tx1"/>
+                  </a:solidFill>
+                  <a:latin typeface="Arial" panose="020B0604020202020204" pitchFamily="34" charset="0"/>
+                  <a:cs typeface="Arial" panose="020B0604020202020204" pitchFamily="34" charset="0"/>
+                </a:rPr>
+                <a:t>()</a:t>
+              </a:r>
+            </a:p>
+            <a:p>
+              <a:r>
+                <a:rPr lang="de-DE" sz="2000" dirty="0" err="1">
+                  <a:solidFill>
+                    <a:schemeClr val="tx1"/>
+                  </a:solidFill>
+                  <a:latin typeface="Arial" panose="020B0604020202020204" pitchFamily="34" charset="0"/>
+                  <a:cs typeface="Arial" panose="020B0604020202020204" pitchFamily="34" charset="0"/>
+                </a:rPr>
+                <a:t>Pause_Music</a:t>
+              </a:r>
+              <a:r>
+                <a:rPr lang="de-DE" sz="2000" dirty="0">
+                  <a:solidFill>
+                    <a:schemeClr val="tx1"/>
+                  </a:solidFill>
+                  <a:latin typeface="Arial" panose="020B0604020202020204" pitchFamily="34" charset="0"/>
+                  <a:cs typeface="Arial" panose="020B0604020202020204" pitchFamily="34" charset="0"/>
+                </a:rPr>
+                <a:t>()</a:t>
+              </a:r>
+            </a:p>
+            <a:p>
+              <a:r>
+                <a:rPr lang="de-DE" sz="2000" dirty="0" err="1">
+                  <a:solidFill>
+                    <a:schemeClr val="tx1"/>
+                  </a:solidFill>
+                  <a:latin typeface="Arial" panose="020B0604020202020204" pitchFamily="34" charset="0"/>
+                  <a:cs typeface="Arial" panose="020B0604020202020204" pitchFamily="34" charset="0"/>
+                </a:rPr>
+                <a:t>Rest_Music</a:t>
+              </a:r>
+              <a:r>
+                <a:rPr lang="de-DE" sz="2000" dirty="0">
+                  <a:solidFill>
+                    <a:schemeClr val="tx1"/>
+                  </a:solidFill>
+                  <a:latin typeface="Arial" panose="020B0604020202020204" pitchFamily="34" charset="0"/>
+                  <a:cs typeface="Arial" panose="020B0604020202020204" pitchFamily="34" charset="0"/>
+                </a:rPr>
+                <a:t>()</a:t>
+              </a:r>
+            </a:p>
+            <a:p>
+              <a:r>
+                <a:rPr lang="de-DE" sz="2000" dirty="0" err="1">
+                  <a:solidFill>
+                    <a:schemeClr val="tx1"/>
+                  </a:solidFill>
+                  <a:latin typeface="Arial" panose="020B0604020202020204" pitchFamily="34" charset="0"/>
+                  <a:cs typeface="Arial" panose="020B0604020202020204" pitchFamily="34" charset="0"/>
+                </a:rPr>
+                <a:t>Toggle_Music</a:t>
+              </a:r>
+              <a:r>
+                <a:rPr lang="de-DE" sz="2000" dirty="0">
+                  <a:solidFill>
+                    <a:schemeClr val="tx1"/>
+                  </a:solidFill>
+                  <a:latin typeface="Arial" panose="020B0604020202020204" pitchFamily="34" charset="0"/>
+                  <a:cs typeface="Arial" panose="020B0604020202020204" pitchFamily="34" charset="0"/>
+                </a:rPr>
+                <a:t>()</a:t>
+              </a:r>
+            </a:p>
+            <a:p>
+              <a:r>
+                <a:rPr lang="de-DE" sz="2000" dirty="0" err="1">
+                  <a:solidFill>
+                    <a:schemeClr val="tx1"/>
+                  </a:solidFill>
+                  <a:latin typeface="Arial" panose="020B0604020202020204" pitchFamily="34" charset="0"/>
+                  <a:cs typeface="Arial" panose="020B0604020202020204" pitchFamily="34" charset="0"/>
+                </a:rPr>
+                <a:t>Visualize</a:t>
+              </a:r>
+              <a:r>
+                <a:rPr lang="de-DE" sz="2000" dirty="0">
+                  <a:solidFill>
+                    <a:schemeClr val="tx1"/>
+                  </a:solidFill>
+                  <a:latin typeface="Arial" panose="020B0604020202020204" pitchFamily="34" charset="0"/>
+                  <a:cs typeface="Arial" panose="020B0604020202020204" pitchFamily="34" charset="0"/>
+                </a:rPr>
+                <a:t>()</a:t>
+              </a:r>
             </a:p>
           </p:txBody>
         </p:sp>
@@ -5187,10 +5264,10 @@
         </p:nvGrpSpPr>
         <p:grpSpPr>
           <a:xfrm>
-            <a:off x="9108795" y="4130949"/>
-            <a:ext cx="2514179" cy="2111631"/>
+            <a:off x="101540" y="95469"/>
+            <a:ext cx="2729209" cy="2541110"/>
             <a:chOff x="537536" y="2441897"/>
-            <a:chExt cx="1915152" cy="2111631"/>
+            <a:chExt cx="1915152" cy="2541110"/>
           </a:xfrm>
         </p:grpSpPr>
         <p:sp>
@@ -5276,7 +5353,7 @@
           <p:spPr>
             <a:xfrm>
               <a:off x="537537" y="2928939"/>
-              <a:ext cx="1915151" cy="631939"/>
+              <a:ext cx="1915151" cy="229813"/>
             </a:xfrm>
             <a:prstGeom prst="rect">
               <a:avLst/>
@@ -5332,8 +5409,8 @@
           </p:nvSpPr>
           <p:spPr>
             <a:xfrm>
-              <a:off x="537536" y="3560878"/>
-              <a:ext cx="1915152" cy="992650"/>
+              <a:off x="537536" y="3154588"/>
+              <a:ext cx="1915152" cy="1828419"/>
             </a:xfrm>
             <a:prstGeom prst="rect">
               <a:avLst/>
@@ -5365,6 +5442,214 @@
             <a:bodyPr lIns="68580" tIns="34292" rIns="68580" bIns="34292" rtlCol="0" anchor="ctr"/>
             <a:lstStyle/>
             <a:p>
+              <a:r>
+                <a:rPr lang="en-US" sz="2000" b="0" dirty="0">
+                  <a:solidFill>
+                    <a:schemeClr val="tx1"/>
+                  </a:solidFill>
+                  <a:effectLst/>
+                  <a:latin typeface="Arial" panose="020B0604020202020204" pitchFamily="34" charset="0"/>
+                  <a:cs typeface="Arial" panose="020B0604020202020204" pitchFamily="34" charset="0"/>
+                </a:rPr>
+                <a:t> </a:t>
+              </a:r>
+              <a:r>
+                <a:rPr lang="en-US" sz="2000" b="0" dirty="0" err="1">
+                  <a:solidFill>
+                    <a:schemeClr val="tx1"/>
+                  </a:solidFill>
+                  <a:effectLst/>
+                  <a:latin typeface="Arial" panose="020B0604020202020204" pitchFamily="34" charset="0"/>
+                  <a:cs typeface="Arial" panose="020B0604020202020204" pitchFamily="34" charset="0"/>
+                </a:rPr>
+                <a:t>event_bt_play</a:t>
+              </a:r>
+              <a:r>
+                <a:rPr lang="en-US" sz="2000" b="0" dirty="0">
+                  <a:solidFill>
+                    <a:schemeClr val="tx1"/>
+                  </a:solidFill>
+                  <a:effectLst/>
+                  <a:latin typeface="Arial" panose="020B0604020202020204" pitchFamily="34" charset="0"/>
+                  <a:cs typeface="Arial" panose="020B0604020202020204" pitchFamily="34" charset="0"/>
+                </a:rPr>
+                <a:t>()</a:t>
+              </a:r>
+            </a:p>
+            <a:p>
+              <a:r>
+                <a:rPr lang="en-US" sz="2000" b="0" dirty="0">
+                  <a:solidFill>
+                    <a:schemeClr val="tx1"/>
+                  </a:solidFill>
+                  <a:effectLst/>
+                  <a:latin typeface="Arial" panose="020B0604020202020204" pitchFamily="34" charset="0"/>
+                  <a:cs typeface="Arial" panose="020B0604020202020204" pitchFamily="34" charset="0"/>
+                </a:rPr>
+                <a:t> </a:t>
+              </a:r>
+              <a:r>
+                <a:rPr lang="en-US" sz="2000" b="0" dirty="0" err="1">
+                  <a:solidFill>
+                    <a:schemeClr val="tx1"/>
+                  </a:solidFill>
+                  <a:effectLst/>
+                  <a:latin typeface="Arial" panose="020B0604020202020204" pitchFamily="34" charset="0"/>
+                  <a:cs typeface="Arial" panose="020B0604020202020204" pitchFamily="34" charset="0"/>
+                </a:rPr>
+                <a:t>event_bt_pause</a:t>
+              </a:r>
+              <a:r>
+                <a:rPr lang="en-US" sz="2000" b="0" dirty="0">
+                  <a:solidFill>
+                    <a:schemeClr val="tx1"/>
+                  </a:solidFill>
+                  <a:effectLst/>
+                  <a:latin typeface="Arial" panose="020B0604020202020204" pitchFamily="34" charset="0"/>
+                  <a:cs typeface="Arial" panose="020B0604020202020204" pitchFamily="34" charset="0"/>
+                </a:rPr>
+                <a:t>()</a:t>
+              </a:r>
+            </a:p>
+            <a:p>
+              <a:r>
+                <a:rPr lang="en-US" sz="2000" b="0" dirty="0">
+                  <a:solidFill>
+                    <a:schemeClr val="tx1"/>
+                  </a:solidFill>
+                  <a:effectLst/>
+                  <a:latin typeface="Arial" panose="020B0604020202020204" pitchFamily="34" charset="0"/>
+                  <a:cs typeface="Arial" panose="020B0604020202020204" pitchFamily="34" charset="0"/>
+                </a:rPr>
+                <a:t> </a:t>
+              </a:r>
+              <a:r>
+                <a:rPr lang="en-US" sz="2000" b="0" dirty="0" err="1">
+                  <a:solidFill>
+                    <a:schemeClr val="tx1"/>
+                  </a:solidFill>
+                  <a:effectLst/>
+                  <a:latin typeface="Arial" panose="020B0604020202020204" pitchFamily="34" charset="0"/>
+                  <a:cs typeface="Arial" panose="020B0604020202020204" pitchFamily="34" charset="0"/>
+                </a:rPr>
+                <a:t>event_bt_stop</a:t>
+              </a:r>
+              <a:r>
+                <a:rPr lang="en-US" sz="2000" b="0" dirty="0">
+                  <a:solidFill>
+                    <a:schemeClr val="tx1"/>
+                  </a:solidFill>
+                  <a:effectLst/>
+                  <a:latin typeface="Arial" panose="020B0604020202020204" pitchFamily="34" charset="0"/>
+                  <a:cs typeface="Arial" panose="020B0604020202020204" pitchFamily="34" charset="0"/>
+                </a:rPr>
+                <a:t>()</a:t>
+              </a:r>
+            </a:p>
+            <a:p>
+              <a:r>
+                <a:rPr lang="en-US" sz="2000" b="0" dirty="0">
+                  <a:solidFill>
+                    <a:schemeClr val="tx1"/>
+                  </a:solidFill>
+                  <a:effectLst/>
+                  <a:latin typeface="Arial" panose="020B0604020202020204" pitchFamily="34" charset="0"/>
+                  <a:cs typeface="Arial" panose="020B0604020202020204" pitchFamily="34" charset="0"/>
+                </a:rPr>
+                <a:t> </a:t>
+              </a:r>
+              <a:r>
+                <a:rPr lang="en-US" sz="2000" b="0" dirty="0" err="1">
+                  <a:solidFill>
+                    <a:schemeClr val="tx1"/>
+                  </a:solidFill>
+                  <a:effectLst/>
+                  <a:latin typeface="Arial" panose="020B0604020202020204" pitchFamily="34" charset="0"/>
+                  <a:cs typeface="Arial" panose="020B0604020202020204" pitchFamily="34" charset="0"/>
+                </a:rPr>
+                <a:t>event_bt_file</a:t>
+              </a:r>
+              <a:r>
+                <a:rPr lang="en-US" sz="2000" b="0" dirty="0">
+                  <a:solidFill>
+                    <a:schemeClr val="tx1"/>
+                  </a:solidFill>
+                  <a:effectLst/>
+                  <a:latin typeface="Arial" panose="020B0604020202020204" pitchFamily="34" charset="0"/>
+                  <a:cs typeface="Arial" panose="020B0604020202020204" pitchFamily="34" charset="0"/>
+                </a:rPr>
+                <a:t>()</a:t>
+              </a:r>
+            </a:p>
+            <a:p>
+              <a:r>
+                <a:rPr lang="en-US" sz="2000" b="0" dirty="0">
+                  <a:solidFill>
+                    <a:schemeClr val="tx1"/>
+                  </a:solidFill>
+                  <a:effectLst/>
+                  <a:latin typeface="Arial" panose="020B0604020202020204" pitchFamily="34" charset="0"/>
+                  <a:cs typeface="Arial" panose="020B0604020202020204" pitchFamily="34" charset="0"/>
+                </a:rPr>
+                <a:t> </a:t>
+              </a:r>
+              <a:r>
+                <a:rPr lang="en-US" sz="2000" b="0" dirty="0" err="1">
+                  <a:solidFill>
+                    <a:schemeClr val="tx1"/>
+                  </a:solidFill>
+                  <a:effectLst/>
+                  <a:latin typeface="Arial" panose="020B0604020202020204" pitchFamily="34" charset="0"/>
+                  <a:cs typeface="Arial" panose="020B0604020202020204" pitchFamily="34" charset="0"/>
+                </a:rPr>
+                <a:t>event_bt_upload</a:t>
+              </a:r>
+              <a:r>
+                <a:rPr lang="en-US" sz="2000" b="0" dirty="0">
+                  <a:solidFill>
+                    <a:schemeClr val="tx1"/>
+                  </a:solidFill>
+                  <a:effectLst/>
+                  <a:latin typeface="Arial" panose="020B0604020202020204" pitchFamily="34" charset="0"/>
+                  <a:cs typeface="Arial" panose="020B0604020202020204" pitchFamily="34" charset="0"/>
+                </a:rPr>
+                <a:t>()</a:t>
+              </a:r>
+            </a:p>
+            <a:p>
+              <a:r>
+                <a:rPr lang="en-US" sz="2000" b="0" dirty="0">
+                  <a:solidFill>
+                    <a:schemeClr val="tx1"/>
+                  </a:solidFill>
+                  <a:effectLst/>
+                  <a:latin typeface="Arial" panose="020B0604020202020204" pitchFamily="34" charset="0"/>
+                  <a:cs typeface="Arial" panose="020B0604020202020204" pitchFamily="34" charset="0"/>
+                </a:rPr>
+                <a:t> </a:t>
+              </a:r>
+              <a:r>
+                <a:rPr lang="en-US" sz="2000" b="0" dirty="0" err="1">
+                  <a:solidFill>
+                    <a:schemeClr val="tx1"/>
+                  </a:solidFill>
+                  <a:effectLst/>
+                  <a:latin typeface="Arial" panose="020B0604020202020204" pitchFamily="34" charset="0"/>
+                  <a:cs typeface="Arial" panose="020B0604020202020204" pitchFamily="34" charset="0"/>
+                </a:rPr>
+                <a:t>event_keypress</a:t>
+              </a:r>
+              <a:r>
+                <a:rPr lang="en-US" sz="2000" b="0" dirty="0">
+                  <a:solidFill>
+                    <a:schemeClr val="tx1"/>
+                  </a:solidFill>
+                  <a:effectLst/>
+                  <a:latin typeface="Arial" panose="020B0604020202020204" pitchFamily="34" charset="0"/>
+                  <a:cs typeface="Arial" panose="020B0604020202020204" pitchFamily="34" charset="0"/>
+                </a:rPr>
+                <a:t>()</a:t>
+              </a:r>
               <a:endParaRPr lang="de-DE" sz="2000" dirty="0">
                 <a:solidFill>
                   <a:schemeClr val="tx1"/>
@@ -5390,10 +5675,10 @@
         </p:nvGrpSpPr>
         <p:grpSpPr>
           <a:xfrm>
-            <a:off x="4838910" y="0"/>
-            <a:ext cx="2514179" cy="2111631"/>
-            <a:chOff x="537536" y="2441897"/>
-            <a:chExt cx="1915152" cy="2111631"/>
+            <a:off x="9027271" y="95469"/>
+            <a:ext cx="3063189" cy="2111631"/>
+            <a:chOff x="537535" y="2441897"/>
+            <a:chExt cx="1915153" cy="2111631"/>
           </a:xfrm>
         </p:grpSpPr>
         <p:sp>
@@ -5478,8 +5763,8 @@
           </p:nvSpPr>
           <p:spPr>
             <a:xfrm>
-              <a:off x="537537" y="2928939"/>
-              <a:ext cx="1915151" cy="631939"/>
+              <a:off x="537537" y="2928940"/>
+              <a:ext cx="1915151" cy="176246"/>
             </a:xfrm>
             <a:prstGeom prst="rect">
               <a:avLst/>
@@ -5535,8 +5820,8 @@
           </p:nvSpPr>
           <p:spPr>
             <a:xfrm>
-              <a:off x="537536" y="3560878"/>
-              <a:ext cx="1915152" cy="992650"/>
+              <a:off x="537535" y="3105186"/>
+              <a:ext cx="1915152" cy="1448342"/>
             </a:xfrm>
             <a:prstGeom prst="rect">
               <a:avLst/>
@@ -5568,10 +5853,125 @@
             <a:bodyPr lIns="68580" tIns="34292" rIns="68580" bIns="34292" rtlCol="0" anchor="ctr"/>
             <a:lstStyle/>
             <a:p>
-              <a:endParaRPr lang="de-DE" sz="2000" dirty="0">
+              <a:r>
+                <a:rPr lang="de-DE" sz="2000" b="0" dirty="0">
+                  <a:solidFill>
+                    <a:schemeClr val="tx1"/>
+                  </a:solidFill>
+                  <a:effectLst/>
+                  <a:latin typeface="Arial" panose="020B0604020202020204" pitchFamily="34" charset="0"/>
+                  <a:cs typeface="Arial" panose="020B0604020202020204" pitchFamily="34" charset="0"/>
+                </a:rPr>
+                <a:t>#Create_Objects()</a:t>
+              </a:r>
+            </a:p>
+            <a:p>
+              <a:r>
+                <a:rPr lang="de-DE" sz="2000" b="0" dirty="0">
+                  <a:solidFill>
+                    <a:schemeClr val="tx1"/>
+                  </a:solidFill>
+                  <a:effectLst/>
+                  <a:latin typeface="Arial" panose="020B0604020202020204" pitchFamily="34" charset="0"/>
+                  <a:cs typeface="Arial" panose="020B0604020202020204" pitchFamily="34" charset="0"/>
+                </a:rPr>
+                <a:t>+</a:t>
+              </a:r>
+              <a:r>
+                <a:rPr lang="de-DE" sz="2000" b="0" dirty="0" err="1">
+                  <a:solidFill>
+                    <a:schemeClr val="tx1"/>
+                  </a:solidFill>
+                  <a:effectLst/>
+                  <a:latin typeface="Arial" panose="020B0604020202020204" pitchFamily="34" charset="0"/>
+                  <a:cs typeface="Arial" panose="020B0604020202020204" pitchFamily="34" charset="0"/>
+                </a:rPr>
+                <a:t>Animate_Visualisation</a:t>
+              </a:r>
+              <a:r>
+                <a:rPr lang="de-DE" sz="2000" b="0" dirty="0">
+                  <a:solidFill>
+                    <a:schemeClr val="tx1"/>
+                  </a:solidFill>
+                  <a:effectLst/>
+                  <a:latin typeface="Arial" panose="020B0604020202020204" pitchFamily="34" charset="0"/>
+                  <a:cs typeface="Arial" panose="020B0604020202020204" pitchFamily="34" charset="0"/>
+                </a:rPr>
+                <a:t>()</a:t>
+              </a:r>
+            </a:p>
+            <a:p>
+              <a:r>
+                <a:rPr lang="de-DE" sz="2000" b="0" dirty="0">
+                  <a:solidFill>
+                    <a:schemeClr val="tx1"/>
+                  </a:solidFill>
+                  <a:effectLst/>
+                  <a:latin typeface="Arial" panose="020B0604020202020204" pitchFamily="34" charset="0"/>
+                  <a:cs typeface="Arial" panose="020B0604020202020204" pitchFamily="34" charset="0"/>
+                </a:rPr>
+                <a:t>+</a:t>
+              </a:r>
+              <a:r>
+                <a:rPr lang="de-DE" sz="2000" b="0" dirty="0" err="1">
+                  <a:solidFill>
+                    <a:schemeClr val="tx1"/>
+                  </a:solidFill>
+                  <a:effectLst/>
+                  <a:latin typeface="Arial" panose="020B0604020202020204" pitchFamily="34" charset="0"/>
+                  <a:cs typeface="Arial" panose="020B0604020202020204" pitchFamily="34" charset="0"/>
+                </a:rPr>
+                <a:t>Animate_Idle</a:t>
+              </a:r>
+              <a:r>
+                <a:rPr lang="de-DE" sz="2000" b="0" dirty="0">
+                  <a:solidFill>
+                    <a:schemeClr val="tx1"/>
+                  </a:solidFill>
+                  <a:effectLst/>
+                  <a:latin typeface="Arial" panose="020B0604020202020204" pitchFamily="34" charset="0"/>
+                  <a:cs typeface="Arial" panose="020B0604020202020204" pitchFamily="34" charset="0"/>
+                </a:rPr>
+                <a:t>()</a:t>
+              </a:r>
+            </a:p>
+            <a:p>
+              <a:r>
+                <a:rPr lang="de-DE" sz="2000" dirty="0">
+                  <a:solidFill>
+                    <a:schemeClr val="tx1"/>
+                  </a:solidFill>
+                  <a:latin typeface="Arial" panose="020B0604020202020204" pitchFamily="34" charset="0"/>
+                  <a:cs typeface="Arial" panose="020B0604020202020204" pitchFamily="34" charset="0"/>
+                </a:rPr>
+                <a:t>+</a:t>
+              </a:r>
+              <a:r>
+                <a:rPr lang="de-DE" sz="2000" b="0" dirty="0" err="1">
+                  <a:solidFill>
+                    <a:schemeClr val="tx1"/>
+                  </a:solidFill>
+                  <a:effectLst/>
+                  <a:latin typeface="Arial" panose="020B0604020202020204" pitchFamily="34" charset="0"/>
+                  <a:cs typeface="Arial" panose="020B0604020202020204" pitchFamily="34" charset="0"/>
+                </a:rPr>
+                <a:t>Animate_Reset</a:t>
+              </a:r>
+              <a:r>
+                <a:rPr lang="de-DE" sz="2000" dirty="0">
+                  <a:solidFill>
+                    <a:schemeClr val="tx1"/>
+                  </a:solidFill>
+                  <a:latin typeface="Arial" panose="020B0604020202020204" pitchFamily="34" charset="0"/>
+                  <a:cs typeface="Arial" panose="020B0604020202020204" pitchFamily="34" charset="0"/>
+                </a:rPr>
+                <a:t>()</a:t>
+              </a:r>
+              <a:endParaRPr lang="de-DE" sz="2000" b="0" dirty="0">
                 <a:solidFill>
                   <a:schemeClr val="tx1"/>
                 </a:solidFill>
+                <a:effectLst/>
                 <a:latin typeface="Arial" panose="020B0604020202020204" pitchFamily="34" charset="0"/>
                 <a:cs typeface="Arial" panose="020B0604020202020204" pitchFamily="34" charset="0"/>
               </a:endParaRPr>
@@ -5579,412 +5979,202 @@
           </p:txBody>
         </p:sp>
       </p:grpSp>
-      <p:grpSp>
-        <p:nvGrpSpPr>
-          <p:cNvPr id="74" name="Gruppieren 73">
-            <a:extLst>
-              <a:ext uri="{FF2B5EF4-FFF2-40B4-BE49-F238E27FC236}">
-                <a16:creationId xmlns:a16="http://schemas.microsoft.com/office/drawing/2014/main" id="{004DB0BC-6DCB-89E6-8860-CFCECA5FF49B}"/>
-              </a:ext>
-            </a:extLst>
-          </p:cNvPr>
-          <p:cNvGrpSpPr/>
+      <p:cxnSp>
+        <p:nvCxnSpPr>
+          <p:cNvPr id="4" name="Gerade Verbindung mit Pfeil 3">
+            <a:extLst>
+              <a:ext uri="{FF2B5EF4-FFF2-40B4-BE49-F238E27FC236}">
+                <a16:creationId xmlns:a16="http://schemas.microsoft.com/office/drawing/2014/main" id="{4C0383EE-354B-10F9-39FF-7CEDCA7082DE}"/>
+              </a:ext>
+            </a:extLst>
+          </p:cNvPr>
+          <p:cNvCxnSpPr>
+            <a:cxnSpLocks/>
+            <a:stCxn id="65" idx="2"/>
+            <a:endCxn id="43" idx="0"/>
+          </p:cNvCxnSpPr>
           <p:nvPr/>
-        </p:nvGrpSpPr>
-        <p:grpSpPr>
-          <a:xfrm>
-            <a:off x="0" y="0"/>
-            <a:ext cx="2514179" cy="2111631"/>
-            <a:chOff x="537536" y="2441897"/>
-            <a:chExt cx="1915152" cy="2111631"/>
+        </p:nvCxnSpPr>
+        <p:spPr>
+          <a:xfrm flipH="1">
+            <a:off x="6095999" y="2699744"/>
+            <a:ext cx="1" cy="1404290"/>
           </a:xfrm>
-        </p:grpSpPr>
-        <p:sp>
-          <p:nvSpPr>
-            <p:cNvPr id="75" name="Rechteck 74">
-              <a:extLst>
-                <a:ext uri="{FF2B5EF4-FFF2-40B4-BE49-F238E27FC236}">
-                  <a16:creationId xmlns:a16="http://schemas.microsoft.com/office/drawing/2014/main" id="{43E7C80F-3D5E-302E-B2C8-7C47A201FE5C}"/>
-                </a:ext>
-              </a:extLst>
-            </p:cNvPr>
-            <p:cNvSpPr/>
-            <p:nvPr/>
-          </p:nvSpPr>
-          <p:spPr>
-            <a:xfrm>
-              <a:off x="537538" y="2441897"/>
-              <a:ext cx="1915150" cy="487042"/>
-            </a:xfrm>
-            <a:prstGeom prst="rect">
-              <a:avLst/>
-            </a:prstGeom>
-            <a:noFill/>
-            <a:ln w="19050">
-              <a:solidFill>
-                <a:schemeClr val="tx1"/>
-              </a:solidFill>
-            </a:ln>
-          </p:spPr>
-          <p:style>
-            <a:lnRef idx="2">
-              <a:schemeClr val="accent1">
-                <a:shade val="15000"/>
-              </a:schemeClr>
-            </a:lnRef>
-            <a:fillRef idx="1">
-              <a:schemeClr val="accent1"/>
-            </a:fillRef>
-            <a:effectRef idx="0">
-              <a:schemeClr val="accent1"/>
-            </a:effectRef>
-            <a:fontRef idx="minor">
-              <a:schemeClr val="lt1"/>
-            </a:fontRef>
-          </p:style>
-          <p:txBody>
-            <a:bodyPr lIns="68580" tIns="34292" rIns="68580" bIns="34292" rtlCol="0" anchor="ctr"/>
-            <a:lstStyle/>
-            <a:p>
-              <a:pPr algn="ctr"/>
-              <a:r>
-                <a:rPr lang="de-DE" sz="2000" b="1" dirty="0" err="1">
-                  <a:solidFill>
-                    <a:schemeClr val="tx1"/>
-                  </a:solidFill>
-                  <a:latin typeface="Arial" panose="020B0604020202020204" pitchFamily="34" charset="0"/>
-                  <a:cs typeface="Arial" panose="020B0604020202020204" pitchFamily="34" charset="0"/>
-                </a:rPr>
-                <a:t>Cube_Scenary</a:t>
-              </a:r>
-              <a:endParaRPr lang="de-DE" sz="2000" b="1" dirty="0">
-                <a:solidFill>
-                  <a:schemeClr val="tx1"/>
-                </a:solidFill>
-                <a:latin typeface="Arial" panose="020B0604020202020204" pitchFamily="34" charset="0"/>
-                <a:cs typeface="Arial" panose="020B0604020202020204" pitchFamily="34" charset="0"/>
-              </a:endParaRPr>
-            </a:p>
-          </p:txBody>
-        </p:sp>
-        <p:sp>
-          <p:nvSpPr>
-            <p:cNvPr id="76" name="Rechteck 75">
-              <a:extLst>
-                <a:ext uri="{FF2B5EF4-FFF2-40B4-BE49-F238E27FC236}">
-                  <a16:creationId xmlns:a16="http://schemas.microsoft.com/office/drawing/2014/main" id="{BD7C375E-13B2-AD14-9759-33B132D2F824}"/>
-                </a:ext>
-              </a:extLst>
-            </p:cNvPr>
-            <p:cNvSpPr/>
-            <p:nvPr/>
-          </p:nvSpPr>
-          <p:spPr>
-            <a:xfrm>
-              <a:off x="537537" y="2928939"/>
-              <a:ext cx="1915151" cy="631939"/>
-            </a:xfrm>
-            <a:prstGeom prst="rect">
-              <a:avLst/>
-            </a:prstGeom>
-            <a:noFill/>
-            <a:ln w="19050">
-              <a:solidFill>
-                <a:schemeClr val="tx1"/>
-              </a:solidFill>
-            </a:ln>
-          </p:spPr>
-          <p:style>
-            <a:lnRef idx="2">
-              <a:schemeClr val="accent1">
-                <a:shade val="15000"/>
-              </a:schemeClr>
-            </a:lnRef>
-            <a:fillRef idx="1">
-              <a:schemeClr val="accent1"/>
-            </a:fillRef>
-            <a:effectRef idx="0">
-              <a:schemeClr val="accent1"/>
-            </a:effectRef>
-            <a:fontRef idx="minor">
-              <a:schemeClr val="lt1"/>
-            </a:fontRef>
-          </p:style>
-          <p:txBody>
-            <a:bodyPr lIns="68580" tIns="34292" rIns="68580" bIns="34292" rtlCol="0" anchor="ctr"/>
-            <a:lstStyle/>
-            <a:p>
-              <a:endParaRPr lang="de-DE" sz="2000" dirty="0">
-                <a:solidFill>
-                  <a:schemeClr val="tx1"/>
-                </a:solidFill>
-                <a:latin typeface="Arial" panose="020B0604020202020204" pitchFamily="34" charset="0"/>
-                <a:cs typeface="Arial" panose="020B0604020202020204" pitchFamily="34" charset="0"/>
-              </a:endParaRPr>
-            </a:p>
-          </p:txBody>
-        </p:sp>
-        <p:sp>
-          <p:nvSpPr>
-            <p:cNvPr id="77" name="Rechteck 76">
-              <a:extLst>
-                <a:ext uri="{FF2B5EF4-FFF2-40B4-BE49-F238E27FC236}">
-                  <a16:creationId xmlns:a16="http://schemas.microsoft.com/office/drawing/2014/main" id="{74DCAD95-BBDF-24C2-1422-FB5E01B846B7}"/>
-                </a:ext>
-              </a:extLst>
-            </p:cNvPr>
-            <p:cNvSpPr/>
-            <p:nvPr/>
-          </p:nvSpPr>
-          <p:spPr>
-            <a:xfrm>
-              <a:off x="537536" y="3560878"/>
-              <a:ext cx="1915152" cy="992650"/>
-            </a:xfrm>
-            <a:prstGeom prst="rect">
-              <a:avLst/>
-            </a:prstGeom>
-            <a:noFill/>
-            <a:ln w="19050">
-              <a:solidFill>
-                <a:schemeClr val="tx1"/>
-              </a:solidFill>
-            </a:ln>
-          </p:spPr>
-          <p:style>
-            <a:lnRef idx="2">
-              <a:schemeClr val="accent1">
-                <a:shade val="15000"/>
-              </a:schemeClr>
-            </a:lnRef>
-            <a:fillRef idx="1">
-              <a:schemeClr val="accent1"/>
-            </a:fillRef>
-            <a:effectRef idx="0">
-              <a:schemeClr val="accent1"/>
-            </a:effectRef>
-            <a:fontRef idx="minor">
-              <a:schemeClr val="lt1"/>
-            </a:fontRef>
-          </p:style>
-          <p:txBody>
-            <a:bodyPr lIns="68580" tIns="34292" rIns="68580" bIns="34292" rtlCol="0" anchor="ctr"/>
-            <a:lstStyle/>
-            <a:p>
-              <a:endParaRPr lang="de-DE" sz="2000" dirty="0">
-                <a:solidFill>
-                  <a:schemeClr val="tx1"/>
-                </a:solidFill>
-                <a:latin typeface="Arial" panose="020B0604020202020204" pitchFamily="34" charset="0"/>
-                <a:cs typeface="Arial" panose="020B0604020202020204" pitchFamily="34" charset="0"/>
-              </a:endParaRPr>
-            </a:p>
-          </p:txBody>
-        </p:sp>
-      </p:grpSp>
-      <p:grpSp>
-        <p:nvGrpSpPr>
-          <p:cNvPr id="78" name="Gruppieren 77">
-            <a:extLst>
-              <a:ext uri="{FF2B5EF4-FFF2-40B4-BE49-F238E27FC236}">
-                <a16:creationId xmlns:a16="http://schemas.microsoft.com/office/drawing/2014/main" id="{47327FDE-22C8-516D-25AD-3DB8AC8B4E12}"/>
-              </a:ext>
-            </a:extLst>
-          </p:cNvPr>
-          <p:cNvGrpSpPr/>
+          <a:prstGeom prst="straightConnector1">
+            <a:avLst/>
+          </a:prstGeom>
+          <a:ln w="19050" cap="flat" cmpd="sng" algn="ctr">
+            <a:solidFill>
+              <a:schemeClr val="dk1"/>
+            </a:solidFill>
+            <a:prstDash val="solid"/>
+            <a:round/>
+            <a:headEnd type="none" w="med" len="med"/>
+            <a:tailEnd type="arrow" w="med" len="lg"/>
+          </a:ln>
+        </p:spPr>
+        <p:style>
+          <a:lnRef idx="0">
+            <a:scrgbClr r="0" g="0" b="0"/>
+          </a:lnRef>
+          <a:fillRef idx="0">
+            <a:scrgbClr r="0" g="0" b="0"/>
+          </a:fillRef>
+          <a:effectRef idx="0">
+            <a:scrgbClr r="0" g="0" b="0"/>
+          </a:effectRef>
+          <a:fontRef idx="minor">
+            <a:schemeClr val="tx1"/>
+          </a:fontRef>
+        </p:style>
+      </p:cxnSp>
+      <p:cxnSp>
+        <p:nvCxnSpPr>
+          <p:cNvPr id="7" name="Gerade Verbindung mit Pfeil 6">
+            <a:extLst>
+              <a:ext uri="{FF2B5EF4-FFF2-40B4-BE49-F238E27FC236}">
+                <a16:creationId xmlns:a16="http://schemas.microsoft.com/office/drawing/2014/main" id="{6982DE37-FACA-8B7B-7080-F95A64FFAA3C}"/>
+              </a:ext>
+            </a:extLst>
+          </p:cNvPr>
+          <p:cNvCxnSpPr>
+            <a:cxnSpLocks/>
+            <a:stCxn id="73" idx="1"/>
+            <a:endCxn id="43" idx="0"/>
+          </p:cNvCxnSpPr>
           <p:nvPr/>
-        </p:nvGrpSpPr>
-        <p:grpSpPr>
-          <a:xfrm>
-            <a:off x="9677821" y="0"/>
-            <a:ext cx="2514179" cy="2111631"/>
-            <a:chOff x="537536" y="2441897"/>
-            <a:chExt cx="1915152" cy="2111631"/>
+        </p:nvCxnSpPr>
+        <p:spPr>
+          <a:xfrm flipH="1">
+            <a:off x="6095999" y="1482929"/>
+            <a:ext cx="2931272" cy="2621105"/>
           </a:xfrm>
-        </p:grpSpPr>
-        <p:sp>
-          <p:nvSpPr>
-            <p:cNvPr id="79" name="Rechteck 78">
-              <a:extLst>
-                <a:ext uri="{FF2B5EF4-FFF2-40B4-BE49-F238E27FC236}">
-                  <a16:creationId xmlns:a16="http://schemas.microsoft.com/office/drawing/2014/main" id="{E8D6E2F4-43D5-3A1A-8F8A-F3E39CA73245}"/>
-                </a:ext>
-              </a:extLst>
-            </p:cNvPr>
-            <p:cNvSpPr/>
-            <p:nvPr/>
-          </p:nvSpPr>
-          <p:spPr>
-            <a:xfrm>
-              <a:off x="537538" y="2441897"/>
-              <a:ext cx="1915150" cy="487042"/>
-            </a:xfrm>
-            <a:prstGeom prst="rect">
-              <a:avLst/>
-            </a:prstGeom>
-            <a:noFill/>
-            <a:ln w="19050">
-              <a:solidFill>
-                <a:schemeClr val="tx1"/>
-              </a:solidFill>
-            </a:ln>
-          </p:spPr>
-          <p:style>
-            <a:lnRef idx="2">
-              <a:schemeClr val="accent1">
-                <a:shade val="15000"/>
-              </a:schemeClr>
-            </a:lnRef>
-            <a:fillRef idx="1">
-              <a:schemeClr val="accent1"/>
-            </a:fillRef>
-            <a:effectRef idx="0">
-              <a:schemeClr val="accent1"/>
-            </a:effectRef>
-            <a:fontRef idx="minor">
-              <a:schemeClr val="lt1"/>
-            </a:fontRef>
-          </p:style>
-          <p:txBody>
-            <a:bodyPr lIns="68580" tIns="34292" rIns="68580" bIns="34292" rtlCol="0" anchor="ctr"/>
-            <a:lstStyle/>
-            <a:p>
-              <a:pPr algn="ctr"/>
-              <a:r>
-                <a:rPr lang="de-DE" sz="2000" b="1" dirty="0" err="1">
-                  <a:solidFill>
-                    <a:schemeClr val="tx1"/>
-                  </a:solidFill>
-                  <a:latin typeface="Arial" panose="020B0604020202020204" pitchFamily="34" charset="0"/>
-                  <a:cs typeface="Arial" panose="020B0604020202020204" pitchFamily="34" charset="0"/>
-                </a:rPr>
-                <a:t>Freq_Bar_Scenary</a:t>
-              </a:r>
-              <a:endParaRPr lang="de-DE" sz="2000" b="1" dirty="0">
-                <a:solidFill>
-                  <a:schemeClr val="tx1"/>
-                </a:solidFill>
-                <a:latin typeface="Arial" panose="020B0604020202020204" pitchFamily="34" charset="0"/>
-                <a:cs typeface="Arial" panose="020B0604020202020204" pitchFamily="34" charset="0"/>
-              </a:endParaRPr>
-            </a:p>
-          </p:txBody>
-        </p:sp>
-        <p:sp>
-          <p:nvSpPr>
-            <p:cNvPr id="80" name="Rechteck 79">
-              <a:extLst>
-                <a:ext uri="{FF2B5EF4-FFF2-40B4-BE49-F238E27FC236}">
-                  <a16:creationId xmlns:a16="http://schemas.microsoft.com/office/drawing/2014/main" id="{B3C12FC3-C927-C16F-121C-515C55E464E9}"/>
-                </a:ext>
-              </a:extLst>
-            </p:cNvPr>
-            <p:cNvSpPr/>
-            <p:nvPr/>
-          </p:nvSpPr>
-          <p:spPr>
-            <a:xfrm>
-              <a:off x="537537" y="2928939"/>
-              <a:ext cx="1915151" cy="631939"/>
-            </a:xfrm>
-            <a:prstGeom prst="rect">
-              <a:avLst/>
-            </a:prstGeom>
-            <a:noFill/>
-            <a:ln w="19050">
-              <a:solidFill>
-                <a:schemeClr val="tx1"/>
-              </a:solidFill>
-            </a:ln>
-          </p:spPr>
-          <p:style>
-            <a:lnRef idx="2">
-              <a:schemeClr val="accent1">
-                <a:shade val="15000"/>
-              </a:schemeClr>
-            </a:lnRef>
-            <a:fillRef idx="1">
-              <a:schemeClr val="accent1"/>
-            </a:fillRef>
-            <a:effectRef idx="0">
-              <a:schemeClr val="accent1"/>
-            </a:effectRef>
-            <a:fontRef idx="minor">
-              <a:schemeClr val="lt1"/>
-            </a:fontRef>
-          </p:style>
-          <p:txBody>
-            <a:bodyPr lIns="68580" tIns="34292" rIns="68580" bIns="34292" rtlCol="0" anchor="ctr"/>
-            <a:lstStyle/>
-            <a:p>
-              <a:endParaRPr lang="de-DE" sz="2000" dirty="0">
-                <a:solidFill>
-                  <a:schemeClr val="tx1"/>
-                </a:solidFill>
-                <a:latin typeface="Arial" panose="020B0604020202020204" pitchFamily="34" charset="0"/>
-                <a:cs typeface="Arial" panose="020B0604020202020204" pitchFamily="34" charset="0"/>
-              </a:endParaRPr>
-            </a:p>
-          </p:txBody>
-        </p:sp>
-        <p:sp>
-          <p:nvSpPr>
-            <p:cNvPr id="81" name="Rechteck 80">
-              <a:extLst>
-                <a:ext uri="{FF2B5EF4-FFF2-40B4-BE49-F238E27FC236}">
-                  <a16:creationId xmlns:a16="http://schemas.microsoft.com/office/drawing/2014/main" id="{DB3FCA4E-F98A-BF79-50B8-1EE5FF14DD8F}"/>
-                </a:ext>
-              </a:extLst>
-            </p:cNvPr>
-            <p:cNvSpPr/>
-            <p:nvPr/>
-          </p:nvSpPr>
-          <p:spPr>
-            <a:xfrm>
-              <a:off x="537536" y="3560878"/>
-              <a:ext cx="1915152" cy="992650"/>
-            </a:xfrm>
-            <a:prstGeom prst="rect">
-              <a:avLst/>
-            </a:prstGeom>
-            <a:noFill/>
-            <a:ln w="19050">
-              <a:solidFill>
-                <a:schemeClr val="tx1"/>
-              </a:solidFill>
-            </a:ln>
-          </p:spPr>
-          <p:style>
-            <a:lnRef idx="2">
-              <a:schemeClr val="accent1">
-                <a:shade val="15000"/>
-              </a:schemeClr>
-            </a:lnRef>
-            <a:fillRef idx="1">
-              <a:schemeClr val="accent1"/>
-            </a:fillRef>
-            <a:effectRef idx="0">
-              <a:schemeClr val="accent1"/>
-            </a:effectRef>
-            <a:fontRef idx="minor">
-              <a:schemeClr val="lt1"/>
-            </a:fontRef>
-          </p:style>
-          <p:txBody>
-            <a:bodyPr lIns="68580" tIns="34292" rIns="68580" bIns="34292" rtlCol="0" anchor="ctr"/>
-            <a:lstStyle/>
-            <a:p>
-              <a:endParaRPr lang="de-DE" sz="2000" dirty="0">
-                <a:solidFill>
-                  <a:schemeClr val="tx1"/>
-                </a:solidFill>
-                <a:latin typeface="Arial" panose="020B0604020202020204" pitchFamily="34" charset="0"/>
-                <a:cs typeface="Arial" panose="020B0604020202020204" pitchFamily="34" charset="0"/>
-              </a:endParaRPr>
-            </a:p>
-          </p:txBody>
-        </p:sp>
-      </p:grpSp>
+          <a:prstGeom prst="straightConnector1">
+            <a:avLst/>
+          </a:prstGeom>
+          <a:ln w="19050" cap="flat" cmpd="sng" algn="ctr">
+            <a:solidFill>
+              <a:schemeClr val="dk1"/>
+            </a:solidFill>
+            <a:prstDash val="solid"/>
+            <a:round/>
+            <a:headEnd type="none" w="med" len="med"/>
+            <a:tailEnd type="arrow" w="med" len="lg"/>
+          </a:ln>
+        </p:spPr>
+        <p:style>
+          <a:lnRef idx="0">
+            <a:scrgbClr r="0" g="0" b="0"/>
+          </a:lnRef>
+          <a:fillRef idx="0">
+            <a:scrgbClr r="0" g="0" b="0"/>
+          </a:fillRef>
+          <a:effectRef idx="0">
+            <a:scrgbClr r="0" g="0" b="0"/>
+          </a:effectRef>
+          <a:fontRef idx="minor">
+            <a:schemeClr val="tx1"/>
+          </a:fontRef>
+        </p:style>
+      </p:cxnSp>
+      <p:cxnSp>
+        <p:nvCxnSpPr>
+          <p:cNvPr id="14" name="Gerade Verbindung mit Pfeil 13">
+            <a:extLst>
+              <a:ext uri="{FF2B5EF4-FFF2-40B4-BE49-F238E27FC236}">
+                <a16:creationId xmlns:a16="http://schemas.microsoft.com/office/drawing/2014/main" id="{6FEA3A2A-9B28-54BD-9355-D7B9BAAB1C1B}"/>
+              </a:ext>
+            </a:extLst>
+          </p:cNvPr>
+          <p:cNvCxnSpPr>
+            <a:cxnSpLocks/>
+            <a:stCxn id="73" idx="1"/>
+            <a:endCxn id="65" idx="3"/>
+          </p:cNvCxnSpPr>
+          <p:nvPr/>
+        </p:nvCxnSpPr>
+        <p:spPr>
+          <a:xfrm flipH="1">
+            <a:off x="7353089" y="1482929"/>
+            <a:ext cx="1674182" cy="273105"/>
+          </a:xfrm>
+          <a:prstGeom prst="straightConnector1">
+            <a:avLst/>
+          </a:prstGeom>
+          <a:ln w="19050" cap="flat" cmpd="sng" algn="ctr">
+            <a:solidFill>
+              <a:schemeClr val="dk1"/>
+            </a:solidFill>
+            <a:prstDash val="dash"/>
+            <a:round/>
+            <a:headEnd type="none" w="med" len="med"/>
+            <a:tailEnd type="arrow" w="med" len="lg"/>
+          </a:ln>
+        </p:spPr>
+        <p:style>
+          <a:lnRef idx="0">
+            <a:scrgbClr r="0" g="0" b="0"/>
+          </a:lnRef>
+          <a:fillRef idx="0">
+            <a:scrgbClr r="0" g="0" b="0"/>
+          </a:fillRef>
+          <a:effectRef idx="0">
+            <a:scrgbClr r="0" g="0" b="0"/>
+          </a:effectRef>
+          <a:fontRef idx="minor">
+            <a:schemeClr val="tx1"/>
+          </a:fontRef>
+        </p:style>
+      </p:cxnSp>
+      <p:cxnSp>
+        <p:nvCxnSpPr>
+          <p:cNvPr id="18" name="Gerade Verbindung mit Pfeil 17">
+            <a:extLst>
+              <a:ext uri="{FF2B5EF4-FFF2-40B4-BE49-F238E27FC236}">
+                <a16:creationId xmlns:a16="http://schemas.microsoft.com/office/drawing/2014/main" id="{42F084DD-EFB1-E485-24B1-8F70F63500E5}"/>
+              </a:ext>
+            </a:extLst>
+          </p:cNvPr>
+          <p:cNvCxnSpPr>
+            <a:cxnSpLocks/>
+            <a:stCxn id="65" idx="1"/>
+            <a:endCxn id="69" idx="3"/>
+          </p:cNvCxnSpPr>
+          <p:nvPr/>
+        </p:nvCxnSpPr>
+        <p:spPr>
+          <a:xfrm flipH="1" flipV="1">
+            <a:off x="2830749" y="1722370"/>
+            <a:ext cx="2008161" cy="33664"/>
+          </a:xfrm>
+          <a:prstGeom prst="straightConnector1">
+            <a:avLst/>
+          </a:prstGeom>
+          <a:ln w="19050" cap="flat" cmpd="sng" algn="ctr">
+            <a:solidFill>
+              <a:schemeClr val="dk1"/>
+            </a:solidFill>
+            <a:prstDash val="dash"/>
+            <a:round/>
+            <a:headEnd type="none" w="med" len="med"/>
+            <a:tailEnd type="arrow" w="med" len="lg"/>
+          </a:ln>
+        </p:spPr>
+        <p:style>
+          <a:lnRef idx="0">
+            <a:scrgbClr r="0" g="0" b="0"/>
+          </a:lnRef>
+          <a:fillRef idx="0">
+            <a:scrgbClr r="0" g="0" b="0"/>
+          </a:fillRef>
+          <a:effectRef idx="0">
+            <a:scrgbClr r="0" g="0" b="0"/>
+          </a:effectRef>
+          <a:fontRef idx="minor">
+            <a:schemeClr val="tx1"/>
+          </a:fontRef>
+        </p:style>
+      </p:cxnSp>
     </p:spTree>
     <p:extLst>
       <p:ext uri="{BB962C8B-B14F-4D97-AF65-F5344CB8AC3E}">

</xml_diff>

<commit_message>
nahezu fertig in Evaluierung Diagramme vervollständigt
</commit_message>
<xml_diff>
--- a/Dokumentation/MuVi_UML.pptx
+++ b/Dokumentation/MuVi_UML.pptx
@@ -272,7 +272,7 @@
           <a:p>
             <a:fld id="{FF92012A-9EAD-4E69-9955-F0E1EC4FC4DA}" type="datetimeFigureOut">
               <a:rPr lang="de-DE" smtClean="0"/>
-              <a:t>14.11.2023</a:t>
+              <a:t>15.11.2023</a:t>
             </a:fld>
             <a:endParaRPr lang="de-DE"/>
           </a:p>
@@ -470,7 +470,7 @@
           <a:p>
             <a:fld id="{FF92012A-9EAD-4E69-9955-F0E1EC4FC4DA}" type="datetimeFigureOut">
               <a:rPr lang="de-DE" smtClean="0"/>
-              <a:t>14.11.2023</a:t>
+              <a:t>15.11.2023</a:t>
             </a:fld>
             <a:endParaRPr lang="de-DE"/>
           </a:p>
@@ -678,7 +678,7 @@
           <a:p>
             <a:fld id="{FF92012A-9EAD-4E69-9955-F0E1EC4FC4DA}" type="datetimeFigureOut">
               <a:rPr lang="de-DE" smtClean="0"/>
-              <a:t>14.11.2023</a:t>
+              <a:t>15.11.2023</a:t>
             </a:fld>
             <a:endParaRPr lang="de-DE"/>
           </a:p>
@@ -876,7 +876,7 @@
           <a:p>
             <a:fld id="{FF92012A-9EAD-4E69-9955-F0E1EC4FC4DA}" type="datetimeFigureOut">
               <a:rPr lang="de-DE" smtClean="0"/>
-              <a:t>14.11.2023</a:t>
+              <a:t>15.11.2023</a:t>
             </a:fld>
             <a:endParaRPr lang="de-DE"/>
           </a:p>
@@ -1151,7 +1151,7 @@
           <a:p>
             <a:fld id="{FF92012A-9EAD-4E69-9955-F0E1EC4FC4DA}" type="datetimeFigureOut">
               <a:rPr lang="de-DE" smtClean="0"/>
-              <a:t>14.11.2023</a:t>
+              <a:t>15.11.2023</a:t>
             </a:fld>
             <a:endParaRPr lang="de-DE"/>
           </a:p>
@@ -1416,7 +1416,7 @@
           <a:p>
             <a:fld id="{FF92012A-9EAD-4E69-9955-F0E1EC4FC4DA}" type="datetimeFigureOut">
               <a:rPr lang="de-DE" smtClean="0"/>
-              <a:t>14.11.2023</a:t>
+              <a:t>15.11.2023</a:t>
             </a:fld>
             <a:endParaRPr lang="de-DE"/>
           </a:p>
@@ -1828,7 +1828,7 @@
           <a:p>
             <a:fld id="{FF92012A-9EAD-4E69-9955-F0E1EC4FC4DA}" type="datetimeFigureOut">
               <a:rPr lang="de-DE" smtClean="0"/>
-              <a:t>14.11.2023</a:t>
+              <a:t>15.11.2023</a:t>
             </a:fld>
             <a:endParaRPr lang="de-DE"/>
           </a:p>
@@ -1969,7 +1969,7 @@
           <a:p>
             <a:fld id="{FF92012A-9EAD-4E69-9955-F0E1EC4FC4DA}" type="datetimeFigureOut">
               <a:rPr lang="de-DE" smtClean="0"/>
-              <a:t>14.11.2023</a:t>
+              <a:t>15.11.2023</a:t>
             </a:fld>
             <a:endParaRPr lang="de-DE"/>
           </a:p>
@@ -2082,7 +2082,7 @@
           <a:p>
             <a:fld id="{FF92012A-9EAD-4E69-9955-F0E1EC4FC4DA}" type="datetimeFigureOut">
               <a:rPr lang="de-DE" smtClean="0"/>
-              <a:t>14.11.2023</a:t>
+              <a:t>15.11.2023</a:t>
             </a:fld>
             <a:endParaRPr lang="de-DE"/>
           </a:p>
@@ -2393,7 +2393,7 @@
           <a:p>
             <a:fld id="{FF92012A-9EAD-4E69-9955-F0E1EC4FC4DA}" type="datetimeFigureOut">
               <a:rPr lang="de-DE" smtClean="0"/>
-              <a:t>14.11.2023</a:t>
+              <a:t>15.11.2023</a:t>
             </a:fld>
             <a:endParaRPr lang="de-DE"/>
           </a:p>
@@ -2681,7 +2681,7 @@
           <a:p>
             <a:fld id="{FF92012A-9EAD-4E69-9955-F0E1EC4FC4DA}" type="datetimeFigureOut">
               <a:rPr lang="de-DE" smtClean="0"/>
-              <a:t>14.11.2023</a:t>
+              <a:t>15.11.2023</a:t>
             </a:fld>
             <a:endParaRPr lang="de-DE"/>
           </a:p>
@@ -2922,7 +2922,7 @@
           <a:p>
             <a:fld id="{FF92012A-9EAD-4E69-9955-F0E1EC4FC4DA}" type="datetimeFigureOut">
               <a:rPr lang="de-DE" smtClean="0"/>
-              <a:t>14.11.2023</a:t>
+              <a:t>15.11.2023</a:t>
             </a:fld>
             <a:endParaRPr lang="de-DE"/>
           </a:p>
@@ -4698,7 +4698,7 @@
         <p:spPr>
           <a:xfrm>
             <a:off x="2830749" y="1722370"/>
-            <a:ext cx="3265250" cy="2381664"/>
+            <a:ext cx="3265251" cy="2281204"/>
           </a:xfrm>
           <a:prstGeom prst="straightConnector1">
             <a:avLst/>
@@ -4742,10 +4742,10 @@
         </p:nvGrpSpPr>
         <p:grpSpPr>
           <a:xfrm>
-            <a:off x="5138422" y="4104034"/>
-            <a:ext cx="1915152" cy="2111631"/>
-            <a:chOff x="537536" y="2441897"/>
-            <a:chExt cx="1915152" cy="2111631"/>
+            <a:off x="4463374" y="4003574"/>
+            <a:ext cx="3265251" cy="2315404"/>
+            <a:chOff x="-812563" y="2441897"/>
+            <a:chExt cx="3265251" cy="2315404"/>
           </a:xfrm>
         </p:grpSpPr>
         <p:sp>
@@ -4762,8 +4762,8 @@
           </p:nvSpPr>
           <p:spPr>
             <a:xfrm>
-              <a:off x="537538" y="2441897"/>
-              <a:ext cx="1915150" cy="487042"/>
+              <a:off x="-812563" y="2441897"/>
+              <a:ext cx="3265251" cy="487042"/>
             </a:xfrm>
             <a:prstGeom prst="rect">
               <a:avLst/>
@@ -4823,8 +4823,8 @@
           </p:nvSpPr>
           <p:spPr>
             <a:xfrm>
-              <a:off x="537537" y="2928939"/>
-              <a:ext cx="1915151" cy="631939"/>
+              <a:off x="-812563" y="2928938"/>
+              <a:ext cx="3265251" cy="1366797"/>
             </a:xfrm>
             <a:prstGeom prst="rect">
               <a:avLst/>
@@ -4856,6 +4856,73 @@
             <a:bodyPr lIns="68580" tIns="34292" rIns="68580" bIns="34292" rtlCol="0" anchor="ctr"/>
             <a:lstStyle/>
             <a:p>
+              <a:r>
+                <a:rPr lang="de-DE" sz="2000" dirty="0" err="1">
+                  <a:solidFill>
+                    <a:schemeClr val="tx1"/>
+                  </a:solidFill>
+                  <a:latin typeface="Arial" panose="020B0604020202020204" pitchFamily="34" charset="0"/>
+                  <a:cs typeface="Arial" panose="020B0604020202020204" pitchFamily="34" charset="0"/>
+                </a:rPr>
+                <a:t>Scene:THREE.Scene</a:t>
+              </a:r>
+              <a:endParaRPr lang="de-DE" sz="2000" dirty="0">
+                <a:solidFill>
+                  <a:schemeClr val="tx1"/>
+                </a:solidFill>
+                <a:latin typeface="Arial" panose="020B0604020202020204" pitchFamily="34" charset="0"/>
+                <a:cs typeface="Arial" panose="020B0604020202020204" pitchFamily="34" charset="0"/>
+              </a:endParaRPr>
+            </a:p>
+            <a:p>
+              <a:r>
+                <a:rPr lang="de-DE" sz="2000" dirty="0" err="1">
+                  <a:solidFill>
+                    <a:schemeClr val="tx1"/>
+                  </a:solidFill>
+                  <a:latin typeface="Arial" panose="020B0604020202020204" pitchFamily="34" charset="0"/>
+                  <a:cs typeface="Arial" panose="020B0604020202020204" pitchFamily="34" charset="0"/>
+                </a:rPr>
+                <a:t>Renderer:THREE.Renderer</a:t>
+              </a:r>
+              <a:endParaRPr lang="de-DE" sz="2000" dirty="0">
+                <a:solidFill>
+                  <a:schemeClr val="tx1"/>
+                </a:solidFill>
+                <a:latin typeface="Arial" panose="020B0604020202020204" pitchFamily="34" charset="0"/>
+                <a:cs typeface="Arial" panose="020B0604020202020204" pitchFamily="34" charset="0"/>
+              </a:endParaRPr>
+            </a:p>
+            <a:p>
+              <a:r>
+                <a:rPr lang="de-DE" sz="2000" dirty="0" err="1">
+                  <a:solidFill>
+                    <a:schemeClr val="tx1"/>
+                  </a:solidFill>
+                  <a:latin typeface="Arial" panose="020B0604020202020204" pitchFamily="34" charset="0"/>
+                  <a:cs typeface="Arial" panose="020B0604020202020204" pitchFamily="34" charset="0"/>
+                </a:rPr>
+                <a:t>Camera:THREE.Camera</a:t>
+              </a:r>
+              <a:endParaRPr lang="de-DE" sz="2000" dirty="0">
+                <a:solidFill>
+                  <a:schemeClr val="tx1"/>
+                </a:solidFill>
+                <a:latin typeface="Arial" panose="020B0604020202020204" pitchFamily="34" charset="0"/>
+                <a:cs typeface="Arial" panose="020B0604020202020204" pitchFamily="34" charset="0"/>
+              </a:endParaRPr>
+            </a:p>
+            <a:p>
+              <a:r>
+                <a:rPr lang="de-DE" sz="2000" dirty="0" err="1">
+                  <a:solidFill>
+                    <a:schemeClr val="tx1"/>
+                  </a:solidFill>
+                  <a:latin typeface="Arial" panose="020B0604020202020204" pitchFamily="34" charset="0"/>
+                  <a:cs typeface="Arial" panose="020B0604020202020204" pitchFamily="34" charset="0"/>
+                </a:rPr>
+                <a:t>Listener:THREE.Listener</a:t>
+              </a:r>
               <a:endParaRPr lang="de-DE" sz="2000" dirty="0">
                 <a:solidFill>
                   <a:schemeClr val="tx1"/>
@@ -4880,8 +4947,8 @@
           </p:nvSpPr>
           <p:spPr>
             <a:xfrm>
-              <a:off x="537536" y="3560878"/>
-              <a:ext cx="1915152" cy="992650"/>
+              <a:off x="-812563" y="4295736"/>
+              <a:ext cx="3265251" cy="461565"/>
             </a:xfrm>
             <a:prstGeom prst="rect">
               <a:avLst/>
@@ -4913,13 +4980,26 @@
             <a:bodyPr lIns="68580" tIns="34292" rIns="68580" bIns="34292" rtlCol="0" anchor="ctr"/>
             <a:lstStyle/>
             <a:p>
-              <a:endParaRPr lang="de-DE" sz="2000" dirty="0">
-                <a:solidFill>
-                  <a:schemeClr val="tx1"/>
-                </a:solidFill>
-                <a:latin typeface="Arial" panose="020B0604020202020204" pitchFamily="34" charset="0"/>
-                <a:cs typeface="Arial" panose="020B0604020202020204" pitchFamily="34" charset="0"/>
-              </a:endParaRPr>
+              <a:r>
+                <a:rPr lang="de-DE" sz="2000" dirty="0" err="1">
+                  <a:solidFill>
+                    <a:schemeClr val="tx1"/>
+                  </a:solidFill>
+                  <a:latin typeface="Arial" panose="020B0604020202020204" pitchFamily="34" charset="0"/>
+                  <a:cs typeface="Arial" panose="020B0604020202020204" pitchFamily="34" charset="0"/>
+                </a:rPr>
+                <a:t>Animate</a:t>
+              </a:r>
+              <a:r>
+                <a:rPr lang="de-DE" sz="2000" dirty="0">
+                  <a:solidFill>
+                    <a:schemeClr val="tx1"/>
+                  </a:solidFill>
+                  <a:latin typeface="Arial" panose="020B0604020202020204" pitchFamily="34" charset="0"/>
+                  <a:cs typeface="Arial" panose="020B0604020202020204" pitchFamily="34" charset="0"/>
+                </a:rPr>
+                <a:t>()</a:t>
+              </a:r>
             </a:p>
           </p:txBody>
         </p:sp>
@@ -5996,9 +6076,9 @@
           <p:nvPr/>
         </p:nvCxnSpPr>
         <p:spPr>
-          <a:xfrm flipH="1">
-            <a:off x="6095999" y="2699744"/>
-            <a:ext cx="1" cy="1404290"/>
+          <a:xfrm>
+            <a:off x="6096000" y="2699744"/>
+            <a:ext cx="0" cy="1303830"/>
           </a:xfrm>
           <a:prstGeom prst="straightConnector1">
             <a:avLst/>
@@ -6046,8 +6126,8 @@
         </p:nvCxnSpPr>
         <p:spPr>
           <a:xfrm flipH="1">
-            <a:off x="6095999" y="1482929"/>
-            <a:ext cx="2931272" cy="2621105"/>
+            <a:off x="6096000" y="1482929"/>
+            <a:ext cx="2931271" cy="2520645"/>
           </a:xfrm>
           <a:prstGeom prst="straightConnector1">
             <a:avLst/>

</xml_diff>